<commit_message>
Updated TCs and documents
Updted TCs, report and presentation
</commit_message>
<xml_diff>
--- a/CPSC_8810_FinalPresentation.pptx
+++ b/CPSC_8810_FinalPresentation.pptx
@@ -8,15 +8,13 @@
     <p:sldId id="256" r:id="rId2"/>
     <p:sldId id="257" r:id="rId3"/>
     <p:sldId id="258" r:id="rId4"/>
-    <p:sldId id="264" r:id="rId5"/>
+    <p:sldId id="266" r:id="rId5"/>
     <p:sldId id="260" r:id="rId6"/>
-    <p:sldId id="266" r:id="rId7"/>
-    <p:sldId id="263" r:id="rId8"/>
-    <p:sldId id="265" r:id="rId9"/>
-    <p:sldId id="261" r:id="rId10"/>
-    <p:sldId id="262" r:id="rId11"/>
-    <p:sldId id="267" r:id="rId12"/>
-    <p:sldId id="268" r:id="rId13"/>
+    <p:sldId id="263" r:id="rId7"/>
+    <p:sldId id="261" r:id="rId8"/>
+    <p:sldId id="262" r:id="rId9"/>
+    <p:sldId id="267" r:id="rId10"/>
+    <p:sldId id="268" r:id="rId11"/>
   </p:sldIdLst>
   <p:sldSz cx="12192000" cy="6858000"/>
   <p:notesSz cx="6858000" cy="9144000"/>
@@ -115,6 +113,11 @@
       </a:defRPr>
     </a:lvl9pPr>
   </p:defaultTextStyle>
+  <p:extLst>
+    <p:ext uri="{EFAFB233-063F-42B5-8137-9DF3F51BA10A}">
+      <p15:sldGuideLst xmlns:p15="http://schemas.microsoft.com/office/powerpoint/2012/main"/>
+    </p:ext>
+  </p:extLst>
 </p:presentation>
 </file>
 
@@ -267,7 +270,7 @@
           <a:p>
             <a:fld id="{3696FA7C-1F5C-45A1-8B83-C9B6FCF8EDBB}" type="datetimeFigureOut">
               <a:rPr lang="en-IN" smtClean="0"/>
-              <a:t>28-04-2023</a:t>
+              <a:t>30-04-2023</a:t>
             </a:fld>
             <a:endParaRPr lang="en-IN"/>
           </a:p>
@@ -467,7 +470,7 @@
           <a:p>
             <a:fld id="{3696FA7C-1F5C-45A1-8B83-C9B6FCF8EDBB}" type="datetimeFigureOut">
               <a:rPr lang="en-IN" smtClean="0"/>
-              <a:t>28-04-2023</a:t>
+              <a:t>30-04-2023</a:t>
             </a:fld>
             <a:endParaRPr lang="en-IN"/>
           </a:p>
@@ -677,7 +680,7 @@
           <a:p>
             <a:fld id="{3696FA7C-1F5C-45A1-8B83-C9B6FCF8EDBB}" type="datetimeFigureOut">
               <a:rPr lang="en-IN" smtClean="0"/>
-              <a:t>28-04-2023</a:t>
+              <a:t>30-04-2023</a:t>
             </a:fld>
             <a:endParaRPr lang="en-IN"/>
           </a:p>
@@ -877,7 +880,7 @@
           <a:p>
             <a:fld id="{3696FA7C-1F5C-45A1-8B83-C9B6FCF8EDBB}" type="datetimeFigureOut">
               <a:rPr lang="en-IN" smtClean="0"/>
-              <a:t>28-04-2023</a:t>
+              <a:t>30-04-2023</a:t>
             </a:fld>
             <a:endParaRPr lang="en-IN"/>
           </a:p>
@@ -1153,7 +1156,7 @@
           <a:p>
             <a:fld id="{3696FA7C-1F5C-45A1-8B83-C9B6FCF8EDBB}" type="datetimeFigureOut">
               <a:rPr lang="en-IN" smtClean="0"/>
-              <a:t>28-04-2023</a:t>
+              <a:t>30-04-2023</a:t>
             </a:fld>
             <a:endParaRPr lang="en-IN"/>
           </a:p>
@@ -1421,7 +1424,7 @@
           <a:p>
             <a:fld id="{3696FA7C-1F5C-45A1-8B83-C9B6FCF8EDBB}" type="datetimeFigureOut">
               <a:rPr lang="en-IN" smtClean="0"/>
-              <a:t>28-04-2023</a:t>
+              <a:t>30-04-2023</a:t>
             </a:fld>
             <a:endParaRPr lang="en-IN"/>
           </a:p>
@@ -1836,7 +1839,7 @@
           <a:p>
             <a:fld id="{3696FA7C-1F5C-45A1-8B83-C9B6FCF8EDBB}" type="datetimeFigureOut">
               <a:rPr lang="en-IN" smtClean="0"/>
-              <a:t>28-04-2023</a:t>
+              <a:t>30-04-2023</a:t>
             </a:fld>
             <a:endParaRPr lang="en-IN"/>
           </a:p>
@@ -1978,7 +1981,7 @@
           <a:p>
             <a:fld id="{3696FA7C-1F5C-45A1-8B83-C9B6FCF8EDBB}" type="datetimeFigureOut">
               <a:rPr lang="en-IN" smtClean="0"/>
-              <a:t>28-04-2023</a:t>
+              <a:t>30-04-2023</a:t>
             </a:fld>
             <a:endParaRPr lang="en-IN"/>
           </a:p>
@@ -2091,7 +2094,7 @@
           <a:p>
             <a:fld id="{3696FA7C-1F5C-45A1-8B83-C9B6FCF8EDBB}" type="datetimeFigureOut">
               <a:rPr lang="en-IN" smtClean="0"/>
-              <a:t>28-04-2023</a:t>
+              <a:t>30-04-2023</a:t>
             </a:fld>
             <a:endParaRPr lang="en-IN"/>
           </a:p>
@@ -2404,7 +2407,7 @@
           <a:p>
             <a:fld id="{3696FA7C-1F5C-45A1-8B83-C9B6FCF8EDBB}" type="datetimeFigureOut">
               <a:rPr lang="en-IN" smtClean="0"/>
-              <a:t>28-04-2023</a:t>
+              <a:t>30-04-2023</a:t>
             </a:fld>
             <a:endParaRPr lang="en-IN"/>
           </a:p>
@@ -2693,7 +2696,7 @@
           <a:p>
             <a:fld id="{3696FA7C-1F5C-45A1-8B83-C9B6FCF8EDBB}" type="datetimeFigureOut">
               <a:rPr lang="en-IN" smtClean="0"/>
-              <a:t>28-04-2023</a:t>
+              <a:t>30-04-2023</a:t>
             </a:fld>
             <a:endParaRPr lang="en-IN"/>
           </a:p>
@@ -2936,7 +2939,7 @@
           <a:p>
             <a:fld id="{3696FA7C-1F5C-45A1-8B83-C9B6FCF8EDBB}" type="datetimeFigureOut">
               <a:rPr lang="en-IN" smtClean="0"/>
-              <a:t>28-04-2023</a:t>
+              <a:t>30-04-2023</a:t>
             </a:fld>
             <a:endParaRPr lang="en-IN"/>
           </a:p>
@@ -3538,212 +3541,6 @@
           <p:cNvPr id="2" name="Title 1">
             <a:extLst>
               <a:ext uri="{FF2B5EF4-FFF2-40B4-BE49-F238E27FC236}">
-                <a16:creationId xmlns:a16="http://schemas.microsoft.com/office/drawing/2014/main" id="{B485CD4E-6307-0825-9300-F9773296D3DC}"/>
-              </a:ext>
-            </a:extLst>
-          </p:cNvPr>
-          <p:cNvSpPr>
-            <a:spLocks noGrp="1"/>
-          </p:cNvSpPr>
-          <p:nvPr>
-            <p:ph type="title"/>
-          </p:nvPr>
-        </p:nvSpPr>
-        <p:spPr/>
-        <p:txBody>
-          <a:bodyPr/>
-          <a:lstStyle/>
-          <a:p>
-            <a:r>
-              <a:rPr lang="en-IN" dirty="0"/>
-              <a:t>Drawbacks -</a:t>
-            </a:r>
-          </a:p>
-        </p:txBody>
-      </p:sp>
-      <p:sp>
-        <p:nvSpPr>
-          <p:cNvPr id="3" name="Content Placeholder 2">
-            <a:extLst>
-              <a:ext uri="{FF2B5EF4-FFF2-40B4-BE49-F238E27FC236}">
-                <a16:creationId xmlns:a16="http://schemas.microsoft.com/office/drawing/2014/main" id="{ACFE8E30-5F95-5B69-2ED6-91282E484EB7}"/>
-              </a:ext>
-            </a:extLst>
-          </p:cNvPr>
-          <p:cNvSpPr>
-            <a:spLocks noGrp="1"/>
-          </p:cNvSpPr>
-          <p:nvPr>
-            <p:ph idx="1"/>
-          </p:nvPr>
-        </p:nvSpPr>
-        <p:spPr>
-          <a:xfrm>
-            <a:off x="838200" y="1557867"/>
-            <a:ext cx="10515600" cy="4314296"/>
-          </a:xfrm>
-        </p:spPr>
-        <p:txBody>
-          <a:bodyPr>
-            <a:normAutofit/>
-          </a:bodyPr>
-          <a:lstStyle/>
-          <a:p>
-            <a:r>
-              <a:rPr lang="en-US" sz="2000" b="0" i="0" dirty="0">
-                <a:effectLst/>
-                <a:latin typeface="Söhne"/>
-              </a:rPr>
-              <a:t>Although RRT* can find a feasible solution with a certain probability, it may not always find the optimal solution and its quality may vary based on the problem and environment.</a:t>
-            </a:r>
-          </a:p>
-          <a:p>
-            <a:r>
-              <a:rPr lang="en-US" sz="2000" b="0" i="0" dirty="0">
-                <a:effectLst/>
-                <a:latin typeface="Söhne"/>
-              </a:rPr>
-              <a:t>RRT* may not be suitable for problems that involve multiple agents or goals that require coordination, as it is designed for motion planning problems with a single start and goal configuration.</a:t>
-            </a:r>
-          </a:p>
-          <a:p>
-            <a:r>
-              <a:rPr lang="en-US" sz="2000" b="0" i="0" dirty="0">
-                <a:effectLst/>
-                <a:latin typeface="Söhne"/>
-              </a:rPr>
-              <a:t>Choosing optimal values for parameters such as step size, sampling density, and exploration radius can be challenging and require significant experimentation due to RRT*'s sensitivity to parameter choices.</a:t>
-            </a:r>
-          </a:p>
-          <a:p>
-            <a:r>
-              <a:rPr lang="en-US" sz="2000" dirty="0"/>
-              <a:t>The drawback of using graph-search techniques for trajectory generation is the resolution lost due to discretization of state space and/or control space. The only boundary states that can be reached are those that already exist in the network.</a:t>
-            </a:r>
-          </a:p>
-          <a:p>
-            <a:endParaRPr lang="en-IN" sz="2000" dirty="0"/>
-          </a:p>
-        </p:txBody>
-      </p:sp>
-    </p:spTree>
-    <p:extLst>
-      <p:ext uri="{BB962C8B-B14F-4D97-AF65-F5344CB8AC3E}">
-        <p14:creationId xmlns:p14="http://schemas.microsoft.com/office/powerpoint/2010/main" val="3079339494"/>
-      </p:ext>
-    </p:extLst>
-  </p:cSld>
-  <p:clrMapOvr>
-    <a:masterClrMapping/>
-  </p:clrMapOvr>
-</p:sld>
-</file>
-
-<file path=ppt/slides/slide11.xml><?xml version="1.0" encoding="utf-8"?>
-<p:sld xmlns:a="http://schemas.openxmlformats.org/drawingml/2006/main" xmlns:r="http://schemas.openxmlformats.org/officeDocument/2006/relationships" xmlns:p="http://schemas.openxmlformats.org/presentationml/2006/main">
-  <p:cSld>
-    <p:spTree>
-      <p:nvGrpSpPr>
-        <p:cNvPr id="1" name=""/>
-        <p:cNvGrpSpPr/>
-        <p:nvPr/>
-      </p:nvGrpSpPr>
-      <p:grpSpPr>
-        <a:xfrm>
-          <a:off x="0" y="0"/>
-          <a:ext cx="0" cy="0"/>
-          <a:chOff x="0" y="0"/>
-          <a:chExt cx="0" cy="0"/>
-        </a:xfrm>
-      </p:grpSpPr>
-      <p:sp>
-        <p:nvSpPr>
-          <p:cNvPr id="2" name="Title 1">
-            <a:extLst>
-              <a:ext uri="{FF2B5EF4-FFF2-40B4-BE49-F238E27FC236}">
-                <a16:creationId xmlns:a16="http://schemas.microsoft.com/office/drawing/2014/main" id="{B161F8FB-7275-797D-C4EF-AB862C5BEB2F}"/>
-              </a:ext>
-            </a:extLst>
-          </p:cNvPr>
-          <p:cNvSpPr>
-            <a:spLocks noGrp="1"/>
-          </p:cNvSpPr>
-          <p:nvPr>
-            <p:ph type="title"/>
-          </p:nvPr>
-        </p:nvSpPr>
-        <p:spPr/>
-        <p:txBody>
-          <a:bodyPr/>
-          <a:lstStyle/>
-          <a:p>
-            <a:r>
-              <a:rPr lang="en-IN" dirty="0"/>
-              <a:t>Path Smoothing Methods -</a:t>
-            </a:r>
-          </a:p>
-        </p:txBody>
-      </p:sp>
-      <p:sp>
-        <p:nvSpPr>
-          <p:cNvPr id="3" name="Content Placeholder 2">
-            <a:extLst>
-              <a:ext uri="{FF2B5EF4-FFF2-40B4-BE49-F238E27FC236}">
-                <a16:creationId xmlns:a16="http://schemas.microsoft.com/office/drawing/2014/main" id="{28F3AE4B-2109-9342-5062-4B2A2A26F388}"/>
-              </a:ext>
-            </a:extLst>
-          </p:cNvPr>
-          <p:cNvSpPr>
-            <a:spLocks noGrp="1"/>
-          </p:cNvSpPr>
-          <p:nvPr>
-            <p:ph idx="1"/>
-          </p:nvPr>
-        </p:nvSpPr>
-        <p:spPr/>
-        <p:txBody>
-          <a:bodyPr/>
-          <a:lstStyle/>
-          <a:p>
-            <a:endParaRPr lang="en-IN"/>
-          </a:p>
-        </p:txBody>
-      </p:sp>
-    </p:spTree>
-    <p:extLst>
-      <p:ext uri="{BB962C8B-B14F-4D97-AF65-F5344CB8AC3E}">
-        <p14:creationId xmlns:p14="http://schemas.microsoft.com/office/powerpoint/2010/main" val="1283607664"/>
-      </p:ext>
-    </p:extLst>
-  </p:cSld>
-  <p:clrMapOvr>
-    <a:masterClrMapping/>
-  </p:clrMapOvr>
-</p:sld>
-</file>
-
-<file path=ppt/slides/slide12.xml><?xml version="1.0" encoding="utf-8"?>
-<p:sld xmlns:a="http://schemas.openxmlformats.org/drawingml/2006/main" xmlns:r="http://schemas.openxmlformats.org/officeDocument/2006/relationships" xmlns:p="http://schemas.openxmlformats.org/presentationml/2006/main">
-  <p:cSld>
-    <p:spTree>
-      <p:nvGrpSpPr>
-        <p:cNvPr id="1" name=""/>
-        <p:cNvGrpSpPr/>
-        <p:nvPr/>
-      </p:nvGrpSpPr>
-      <p:grpSpPr>
-        <a:xfrm>
-          <a:off x="0" y="0"/>
-          <a:ext cx="0" cy="0"/>
-          <a:chOff x="0" y="0"/>
-          <a:chExt cx="0" cy="0"/>
-        </a:xfrm>
-      </p:grpSpPr>
-      <p:sp>
-        <p:nvSpPr>
-          <p:cNvPr id="2" name="Title 1">
-            <a:extLst>
-              <a:ext uri="{FF2B5EF4-FFF2-40B4-BE49-F238E27FC236}">
                 <a16:creationId xmlns:a16="http://schemas.microsoft.com/office/drawing/2014/main" id="{106BFD97-4B7D-69BB-6717-389BCE3892C4}"/>
               </a:ext>
             </a:extLst>
@@ -3936,14 +3733,20 @@
             </a:endParaRPr>
           </a:p>
           <a:p>
-            <a:r>
-              <a:rPr lang="en-US" sz="2000" b="0" i="0" dirty="0">
-                <a:effectLst/>
-                <a:latin typeface="Söhne"/>
+            <a:pPr marL="0"/>
+            <a:r>
+              <a:rPr lang="en-US" sz="2000" dirty="0">
+                <a:latin typeface="Arial" panose="020B0604020202020204" pitchFamily="34" charset="0"/>
+                <a:ea typeface="Calibri" panose="020F0502020204030204" pitchFamily="34" charset="0"/>
+                <a:cs typeface="Arial" panose="020B0604020202020204" pitchFamily="34" charset="0"/>
               </a:rPr>
               <a:t>RRT* algorithm incrementally builds a tree of random configurations in the search space, similar to RRT, and attempts to rewire the tree iteratively by adding new connections between nodes resulting in a low-cost path optimized tree structure.</a:t>
             </a:r>
-            <a:endParaRPr lang="en-IN" sz="2000" dirty="0"/>
+            <a:endParaRPr lang="en-IN" sz="2000" dirty="0">
+              <a:latin typeface="Arial" panose="020B0604020202020204" pitchFamily="34" charset="0"/>
+              <a:ea typeface="Calibri" panose="020F0502020204030204" pitchFamily="34" charset="0"/>
+              <a:cs typeface="Arial" panose="020B0604020202020204" pitchFamily="34" charset="0"/>
+            </a:endParaRPr>
           </a:p>
         </p:txBody>
       </p:sp>
@@ -4020,25 +3823,35 @@
             <a:r>
               <a:rPr lang="en-US" sz="2000" b="0" i="0" dirty="0">
                 <a:effectLst/>
-                <a:latin typeface="Söhne"/>
+                <a:latin typeface="Arial" panose="020B0604020202020204" pitchFamily="34" charset="0"/>
+                <a:ea typeface="Calibri" panose="020F0502020204030204" pitchFamily="34" charset="0"/>
+                <a:cs typeface="Arial" panose="020B0604020202020204" pitchFamily="34" charset="0"/>
               </a:rPr>
               <a:t>Develop an efficient RRT* algorithm to plan collision-free motion for a nonholonomic </a:t>
             </a:r>
             <a:r>
               <a:rPr lang="en-US" sz="2000" b="0" i="0" dirty="0" err="1">
                 <a:effectLst/>
-                <a:latin typeface="Söhne"/>
+                <a:latin typeface="Arial" panose="020B0604020202020204" pitchFamily="34" charset="0"/>
+                <a:ea typeface="Calibri" panose="020F0502020204030204" pitchFamily="34" charset="0"/>
+                <a:cs typeface="Arial" panose="020B0604020202020204" pitchFamily="34" charset="0"/>
               </a:rPr>
               <a:t>Dubins</a:t>
             </a:r>
             <a:r>
               <a:rPr lang="en-US" sz="2000" b="0" i="0" dirty="0">
                 <a:effectLst/>
-                <a:latin typeface="Söhne"/>
+                <a:latin typeface="Arial" panose="020B0604020202020204" pitchFamily="34" charset="0"/>
+                <a:ea typeface="Calibri" panose="020F0502020204030204" pitchFamily="34" charset="0"/>
+                <a:cs typeface="Arial" panose="020B0604020202020204" pitchFamily="34" charset="0"/>
               </a:rPr>
               <a:t> car through 2D obstacles, while considering its motion constraints.</a:t>
             </a:r>
-            <a:endParaRPr lang="en-IN" sz="2000" dirty="0"/>
+            <a:endParaRPr lang="en-IN" sz="2000" dirty="0">
+              <a:latin typeface="Arial" panose="020B0604020202020204" pitchFamily="34" charset="0"/>
+              <a:ea typeface="Calibri" panose="020F0502020204030204" pitchFamily="34" charset="0"/>
+              <a:cs typeface="Arial" panose="020B0604020202020204" pitchFamily="34" charset="0"/>
+            </a:endParaRPr>
           </a:p>
         </p:txBody>
       </p:sp>
@@ -4133,10 +3946,11 @@
           </a:bodyPr>
           <a:lstStyle/>
           <a:p>
-            <a:r>
-              <a:rPr lang="en-US" sz="2000" b="0" dirty="0">
-                <a:effectLst/>
+            <a:pPr marL="0"/>
+            <a:r>
+              <a:rPr lang="en-US" sz="2000" dirty="0">
                 <a:latin typeface="Arial" panose="020B0604020202020204" pitchFamily="34" charset="0"/>
+                <a:ea typeface="Calibri" panose="020F0502020204030204" pitchFamily="34" charset="0"/>
                 <a:cs typeface="Arial" panose="020B0604020202020204" pitchFamily="34" charset="0"/>
               </a:rPr>
               <a:t>Car: Non Holonomic </a:t>
@@ -4144,72 +3958,69 @@
             <a:r>
               <a:rPr lang="en-US" sz="2000" dirty="0" err="1">
                 <a:latin typeface="Arial" panose="020B0604020202020204" pitchFamily="34" charset="0"/>
+                <a:ea typeface="Calibri" panose="020F0502020204030204" pitchFamily="34" charset="0"/>
                 <a:cs typeface="Arial" panose="020B0604020202020204" pitchFamily="34" charset="0"/>
               </a:rPr>
-              <a:t>d</a:t>
-            </a:r>
-            <a:r>
-              <a:rPr lang="en-US" sz="2000" b="0" dirty="0" err="1">
-                <a:effectLst/>
+              <a:t>dubins</a:t>
+            </a:r>
+            <a:r>
+              <a:rPr lang="en-US" sz="2000" dirty="0">
                 <a:latin typeface="Arial" panose="020B0604020202020204" pitchFamily="34" charset="0"/>
-                <a:cs typeface="Arial" panose="020B0604020202020204" pitchFamily="34" charset="0"/>
-              </a:rPr>
-              <a:t>ubins</a:t>
-            </a:r>
-            <a:r>
-              <a:rPr lang="en-US" sz="2000" b="0" dirty="0">
-                <a:effectLst/>
-                <a:latin typeface="Arial" panose="020B0604020202020204" pitchFamily="34" charset="0"/>
+                <a:ea typeface="Calibri" panose="020F0502020204030204" pitchFamily="34" charset="0"/>
                 <a:cs typeface="Arial" panose="020B0604020202020204" pitchFamily="34" charset="0"/>
               </a:rPr>
               <a:t> Car, this contains the information of initial and final positions, as well as its motion constraints.</a:t>
             </a:r>
             <a:br>
-              <a:rPr lang="en-US" sz="2000" b="0" dirty="0">
-                <a:effectLst/>
+              <a:rPr lang="en-US" sz="2000" dirty="0">
                 <a:latin typeface="Arial" panose="020B0604020202020204" pitchFamily="34" charset="0"/>
+                <a:ea typeface="Calibri" panose="020F0502020204030204" pitchFamily="34" charset="0"/>
                 <a:cs typeface="Arial" panose="020B0604020202020204" pitchFamily="34" charset="0"/>
               </a:rPr>
             </a:br>
             <a:endParaRPr lang="en-US" sz="2000" dirty="0">
               <a:latin typeface="Arial" panose="020B0604020202020204" pitchFamily="34" charset="0"/>
+              <a:ea typeface="Calibri" panose="020F0502020204030204" pitchFamily="34" charset="0"/>
               <a:cs typeface="Arial" panose="020B0604020202020204" pitchFamily="34" charset="0"/>
             </a:endParaRPr>
           </a:p>
           <a:p>
-            <a:r>
-              <a:rPr lang="en-US" sz="2000" b="0" dirty="0" err="1">
-                <a:effectLst/>
+            <a:pPr marL="0"/>
+            <a:r>
+              <a:rPr lang="en-US" sz="2000" dirty="0" err="1">
                 <a:latin typeface="Arial" panose="020B0604020202020204" pitchFamily="34" charset="0"/>
+                <a:ea typeface="Calibri" panose="020F0502020204030204" pitchFamily="34" charset="0"/>
                 <a:cs typeface="Arial" panose="020B0604020202020204" pitchFamily="34" charset="0"/>
               </a:rPr>
               <a:t>max_steps</a:t>
             </a:r>
             <a:r>
-              <a:rPr lang="en-US" sz="2000" b="0" dirty="0">
-                <a:effectLst/>
+              <a:rPr lang="en-US" sz="2000" dirty="0">
                 <a:latin typeface="Arial" panose="020B0604020202020204" pitchFamily="34" charset="0"/>
+                <a:ea typeface="Calibri" panose="020F0502020204030204" pitchFamily="34" charset="0"/>
                 <a:cs typeface="Arial" panose="020B0604020202020204" pitchFamily="34" charset="0"/>
               </a:rPr>
               <a:t>: Maximum number of steps the algorithm will take before terminating. It has an influence on the execution time and computational resources required for planning.</a:t>
             </a:r>
             <a:br>
-              <a:rPr lang="en-US" sz="2000" b="0" dirty="0">
-                <a:effectLst/>
+              <a:rPr lang="en-US" sz="2000" dirty="0">
                 <a:latin typeface="Arial" panose="020B0604020202020204" pitchFamily="34" charset="0"/>
+                <a:ea typeface="Calibri" panose="020F0502020204030204" pitchFamily="34" charset="0"/>
                 <a:cs typeface="Arial" panose="020B0604020202020204" pitchFamily="34" charset="0"/>
               </a:rPr>
             </a:br>
             <a:endParaRPr lang="en-US" sz="2000" dirty="0">
               <a:latin typeface="Arial" panose="020B0604020202020204" pitchFamily="34" charset="0"/>
+              <a:ea typeface="Calibri" panose="020F0502020204030204" pitchFamily="34" charset="0"/>
               <a:cs typeface="Arial" panose="020B0604020202020204" pitchFamily="34" charset="0"/>
             </a:endParaRPr>
           </a:p>
           <a:p>
-            <a:r>
-              <a:rPr lang="en-US" sz="2000" b="0" dirty="0" err="1">
-                <a:effectLst/>
+            <a:pPr marL="0"/>
+            <a:r>
+              <a:rPr lang="en-US" sz="2000" dirty="0" err="1">
                 <a:latin typeface="Arial" panose="020B0604020202020204" pitchFamily="34" charset="0"/>
+                <a:ea typeface="Calibri" panose="020F0502020204030204" pitchFamily="34" charset="0"/>
                 <a:cs typeface="Arial" panose="020B0604020202020204" pitchFamily="34" charset="0"/>
               </a:rPr>
               <a:t>pick_target</a:t>
@@ -4217,6 +4028,7 @@
             <a:r>
               <a:rPr lang="en-US" sz="2000" dirty="0">
                 <a:latin typeface="Arial" panose="020B0604020202020204" pitchFamily="34" charset="0"/>
+                <a:ea typeface="Calibri" panose="020F0502020204030204" pitchFamily="34" charset="0"/>
                 <a:cs typeface="Arial" panose="020B0604020202020204" pitchFamily="34" charset="0"/>
               </a:rPr>
               <a:t>: Frequency at which the algorithm will select a new target node to expand the tree towards the goal. A higher value will result in more frequent expansions on contrary to a lower value which will result in fewer expansions.</a:t>
@@ -4224,57 +4036,46 @@
             <a:br>
               <a:rPr lang="en-US" sz="2000" dirty="0">
                 <a:latin typeface="Arial" panose="020B0604020202020204" pitchFamily="34" charset="0"/>
+                <a:ea typeface="Calibri" panose="020F0502020204030204" pitchFamily="34" charset="0"/>
                 <a:cs typeface="Arial" panose="020B0604020202020204" pitchFamily="34" charset="0"/>
               </a:rPr>
             </a:br>
             <a:endParaRPr lang="en-US" sz="2000" dirty="0">
               <a:latin typeface="Arial" panose="020B0604020202020204" pitchFamily="34" charset="0"/>
+              <a:ea typeface="Calibri" panose="020F0502020204030204" pitchFamily="34" charset="0"/>
               <a:cs typeface="Arial" panose="020B0604020202020204" pitchFamily="34" charset="0"/>
             </a:endParaRPr>
           </a:p>
           <a:p>
-            <a:r>
-              <a:rPr lang="en-US" sz="2000" b="0" dirty="0" err="1">
-                <a:effectLst/>
+            <a:pPr marL="0"/>
+            <a:r>
+              <a:rPr lang="en-US" sz="2000" dirty="0" err="1">
                 <a:latin typeface="Arial" panose="020B0604020202020204" pitchFamily="34" charset="0"/>
+                <a:ea typeface="Calibri" panose="020F0502020204030204" pitchFamily="34" charset="0"/>
                 <a:cs typeface="Arial" panose="020B0604020202020204" pitchFamily="34" charset="0"/>
               </a:rPr>
               <a:t>check_dubins</a:t>
             </a:r>
             <a:r>
-              <a:rPr lang="en-US" sz="2000" b="0" dirty="0">
-                <a:effectLst/>
+              <a:rPr lang="en-US" sz="2000" dirty="0">
                 <a:latin typeface="Arial" panose="020B0604020202020204" pitchFamily="34" charset="0"/>
+                <a:ea typeface="Calibri" panose="020F0502020204030204" pitchFamily="34" charset="0"/>
                 <a:cs typeface="Arial" panose="020B0604020202020204" pitchFamily="34" charset="0"/>
               </a:rPr>
-              <a:t>: This parameter checks for the </a:t>
+              <a:t>: This parameter checks for the direct </a:t>
+            </a:r>
+            <a:r>
+              <a:rPr lang="en-US" sz="2000" dirty="0" err="1">
+                <a:latin typeface="Arial" panose="020B0604020202020204" pitchFamily="34" charset="0"/>
+                <a:ea typeface="Calibri" panose="020F0502020204030204" pitchFamily="34" charset="0"/>
+                <a:cs typeface="Arial" panose="020B0604020202020204" pitchFamily="34" charset="0"/>
+              </a:rPr>
+              <a:t>dubins</a:t>
             </a:r>
             <a:r>
               <a:rPr lang="en-US" sz="2000" dirty="0">
                 <a:latin typeface="Arial" panose="020B0604020202020204" pitchFamily="34" charset="0"/>
-                <a:cs typeface="Arial" panose="020B0604020202020204" pitchFamily="34" charset="0"/>
-              </a:rPr>
-              <a:t>direct </a:t>
-            </a:r>
-            <a:r>
-              <a:rPr lang="en-US" sz="2000" dirty="0" err="1">
-                <a:latin typeface="Arial" panose="020B0604020202020204" pitchFamily="34" charset="0"/>
-                <a:cs typeface="Arial" panose="020B0604020202020204" pitchFamily="34" charset="0"/>
-              </a:rPr>
-              <a:t>d</a:t>
-            </a:r>
-            <a:r>
-              <a:rPr lang="en-US" sz="2000" b="0" dirty="0" err="1">
-                <a:effectLst/>
-                <a:latin typeface="Arial" panose="020B0604020202020204" pitchFamily="34" charset="0"/>
-                <a:cs typeface="Arial" panose="020B0604020202020204" pitchFamily="34" charset="0"/>
-              </a:rPr>
-              <a:t>ubins</a:t>
-            </a:r>
-            <a:r>
-              <a:rPr lang="en-US" sz="2000" b="0" dirty="0">
-                <a:effectLst/>
-                <a:latin typeface="Arial" panose="020B0604020202020204" pitchFamily="34" charset="0"/>
+                <a:ea typeface="Calibri" panose="020F0502020204030204" pitchFamily="34" charset="0"/>
                 <a:cs typeface="Arial" panose="020B0604020202020204" pitchFamily="34" charset="0"/>
               </a:rPr>
               <a:t> paths when adding new edges to the tree. Also, it expands the </a:t>
@@ -4282,43 +4083,38 @@
             <a:r>
               <a:rPr lang="en-US" sz="2000" dirty="0" err="1">
                 <a:latin typeface="Arial" panose="020B0604020202020204" pitchFamily="34" charset="0"/>
+                <a:ea typeface="Calibri" panose="020F0502020204030204" pitchFamily="34" charset="0"/>
                 <a:cs typeface="Arial" panose="020B0604020202020204" pitchFamily="34" charset="0"/>
               </a:rPr>
-              <a:t>d</a:t>
-            </a:r>
-            <a:r>
-              <a:rPr lang="en-US" sz="2000" b="0" dirty="0" err="1">
-                <a:effectLst/>
+              <a:t>dubins</a:t>
+            </a:r>
+            <a:r>
+              <a:rPr lang="en-US" sz="2000" dirty="0">
                 <a:latin typeface="Arial" panose="020B0604020202020204" pitchFamily="34" charset="0"/>
-                <a:cs typeface="Arial" panose="020B0604020202020204" pitchFamily="34" charset="0"/>
-              </a:rPr>
-              <a:t>ubins</a:t>
-            </a:r>
-            <a:r>
-              <a:rPr lang="en-US" sz="2000" b="0" dirty="0">
-                <a:effectLst/>
-                <a:latin typeface="Arial" panose="020B0604020202020204" pitchFamily="34" charset="0"/>
+                <a:ea typeface="Calibri" panose="020F0502020204030204" pitchFamily="34" charset="0"/>
                 <a:cs typeface="Arial" panose="020B0604020202020204" pitchFamily="34" charset="0"/>
               </a:rPr>
               <a:t> analytic solution that connects to the final position if the solution is valid and collision free. This also sets a frequency to check for connecting to the final position.</a:t>
             </a:r>
             <a:br>
-              <a:rPr lang="en-US" sz="2000" b="0" dirty="0">
-                <a:effectLst/>
+              <a:rPr lang="en-US" sz="2000" dirty="0">
                 <a:latin typeface="Arial" panose="020B0604020202020204" pitchFamily="34" charset="0"/>
+                <a:ea typeface="Calibri" panose="020F0502020204030204" pitchFamily="34" charset="0"/>
                 <a:cs typeface="Arial" panose="020B0604020202020204" pitchFamily="34" charset="0"/>
               </a:rPr>
             </a:br>
             <a:endParaRPr lang="en-US" sz="2000" dirty="0">
               <a:latin typeface="Arial" panose="020B0604020202020204" pitchFamily="34" charset="0"/>
+              <a:ea typeface="Calibri" panose="020F0502020204030204" pitchFamily="34" charset="0"/>
               <a:cs typeface="Arial" panose="020B0604020202020204" pitchFamily="34" charset="0"/>
             </a:endParaRPr>
           </a:p>
           <a:p>
-            <a:r>
-              <a:rPr lang="en-US" sz="2000" b="0" dirty="0" err="1">
-                <a:effectLst/>
+            <a:pPr marL="0"/>
+            <a:r>
+              <a:rPr lang="en-US" sz="2000" dirty="0" err="1">
                 <a:latin typeface="Arial" panose="020B0604020202020204" pitchFamily="34" charset="0"/>
+                <a:ea typeface="Calibri" panose="020F0502020204030204" pitchFamily="34" charset="0"/>
                 <a:cs typeface="Arial" panose="020B0604020202020204" pitchFamily="34" charset="0"/>
               </a:rPr>
               <a:t>search_radius</a:t>
@@ -4326,34 +4122,16 @@
             <a:r>
               <a:rPr lang="en-US" sz="2000" dirty="0">
                 <a:latin typeface="Arial" panose="020B0604020202020204" pitchFamily="34" charset="0"/>
+                <a:ea typeface="Calibri" panose="020F0502020204030204" pitchFamily="34" charset="0"/>
                 <a:cs typeface="Arial" panose="020B0604020202020204" pitchFamily="34" charset="0"/>
               </a:rPr>
-              <a:t>:</a:t>
-            </a:r>
-            <a:r>
-              <a:rPr lang="en-US" sz="2000" b="0" dirty="0">
-                <a:effectLst/>
-                <a:latin typeface="Arial" panose="020B0604020202020204" pitchFamily="34" charset="0"/>
-                <a:cs typeface="Arial" panose="020B0604020202020204" pitchFamily="34" charset="0"/>
-              </a:rPr>
-              <a:t> </a:t>
-            </a:r>
-            <a:r>
-              <a:rPr lang="en-US" sz="2000" dirty="0">
-                <a:latin typeface="Arial" panose="020B0604020202020204" pitchFamily="34" charset="0"/>
-                <a:cs typeface="Arial" panose="020B0604020202020204" pitchFamily="34" charset="0"/>
-              </a:rPr>
-              <a:t>M</a:t>
-            </a:r>
-            <a:r>
-              <a:rPr lang="en-US" sz="2000" b="0" dirty="0">
-                <a:effectLst/>
-                <a:latin typeface="Arial" panose="020B0604020202020204" pitchFamily="34" charset="0"/>
-                <a:cs typeface="Arial" panose="020B0604020202020204" pitchFamily="34" charset="0"/>
-              </a:rPr>
-              <a:t>aximum distance the algorithm will search for nodes to connect while expanding the tree. A larger value will result in wider search area.</a:t>
-            </a:r>
-            <a:endParaRPr lang="en-IN" sz="1200" dirty="0"/>
+              <a:t>: Maximum distance the algorithm will search for nodes to connect while expanding the tree. A larger value will result in wider search area.</a:t>
+            </a:r>
+            <a:endParaRPr lang="en-IN" sz="2000" dirty="0">
+              <a:latin typeface="Arial" panose="020B0604020202020204" pitchFamily="34" charset="0"/>
+              <a:ea typeface="Calibri" panose="020F0502020204030204" pitchFamily="34" charset="0"/>
+              <a:cs typeface="Arial" panose="020B0604020202020204" pitchFamily="34" charset="0"/>
+            </a:endParaRPr>
           </a:p>
         </p:txBody>
       </p:sp>
@@ -4392,7 +4170,7 @@
           <p:cNvPr id="2" name="Title 1">
             <a:extLst>
               <a:ext uri="{FF2B5EF4-FFF2-40B4-BE49-F238E27FC236}">
-                <a16:creationId xmlns:a16="http://schemas.microsoft.com/office/drawing/2014/main" id="{BD60ACA3-58C4-9182-F55E-D552855F27CE}"/>
+                <a16:creationId xmlns:a16="http://schemas.microsoft.com/office/drawing/2014/main" id="{A664A7C9-46B7-A164-90DC-81A930F11387}"/>
               </a:ext>
             </a:extLst>
           </p:cNvPr>
@@ -4405,12 +4183,14 @@
         </p:nvSpPr>
         <p:spPr>
           <a:xfrm>
-            <a:off x="576131" y="374651"/>
-            <a:ext cx="10515600" cy="744008"/>
-          </a:xfrm>
-        </p:spPr>
-        <p:txBody>
-          <a:bodyPr/>
+            <a:off x="351366" y="382059"/>
+            <a:ext cx="10515600" cy="557741"/>
+          </a:xfrm>
+        </p:spPr>
+        <p:txBody>
+          <a:bodyPr>
+            <a:normAutofit fontScale="90000"/>
+          </a:bodyPr>
           <a:lstStyle/>
           <a:p>
             <a:r>
@@ -4420,21 +4200,124 @@
           </a:p>
         </p:txBody>
       </p:sp>
+      <p:sp>
+        <p:nvSpPr>
+          <p:cNvPr id="12" name="TextBox 11">
+            <a:extLst>
+              <a:ext uri="{FF2B5EF4-FFF2-40B4-BE49-F238E27FC236}">
+                <a16:creationId xmlns:a16="http://schemas.microsoft.com/office/drawing/2014/main" id="{FE68F358-959E-45E7-D433-852CE9D9C3A7}"/>
+              </a:ext>
+            </a:extLst>
+          </p:cNvPr>
+          <p:cNvSpPr txBox="1"/>
+          <p:nvPr/>
+        </p:nvSpPr>
+        <p:spPr>
+          <a:xfrm>
+            <a:off x="2507932" y="1621429"/>
+            <a:ext cx="622936" cy="376384"/>
+          </a:xfrm>
+          <a:prstGeom prst="rect">
+            <a:avLst/>
+          </a:prstGeom>
+          <a:noFill/>
+        </p:spPr>
+        <p:txBody>
+          <a:bodyPr wrap="square" rtlCol="0">
+            <a:spAutoFit/>
+          </a:bodyPr>
+          <a:lstStyle/>
+          <a:p>
+            <a:r>
+              <a:rPr lang="en-IN" b="1" dirty="0"/>
+              <a:t>RRT</a:t>
+            </a:r>
+          </a:p>
+        </p:txBody>
+      </p:sp>
+      <p:sp>
+        <p:nvSpPr>
+          <p:cNvPr id="17" name="TextBox 16">
+            <a:extLst>
+              <a:ext uri="{FF2B5EF4-FFF2-40B4-BE49-F238E27FC236}">
+                <a16:creationId xmlns:a16="http://schemas.microsoft.com/office/drawing/2014/main" id="{5476DF6A-6E2C-E0B4-CC51-D2CC2D5CA585}"/>
+              </a:ext>
+            </a:extLst>
+          </p:cNvPr>
+          <p:cNvSpPr txBox="1"/>
+          <p:nvPr/>
+        </p:nvSpPr>
+        <p:spPr>
+          <a:xfrm>
+            <a:off x="9156387" y="1619444"/>
+            <a:ext cx="1153506" cy="376384"/>
+          </a:xfrm>
+          <a:prstGeom prst="rect">
+            <a:avLst/>
+          </a:prstGeom>
+          <a:noFill/>
+        </p:spPr>
+        <p:txBody>
+          <a:bodyPr wrap="square" rtlCol="0">
+            <a:spAutoFit/>
+          </a:bodyPr>
+          <a:lstStyle/>
+          <a:p>
+            <a:r>
+              <a:rPr lang="en-IN" b="1" dirty="0"/>
+              <a:t>RRT*</a:t>
+            </a:r>
+          </a:p>
+        </p:txBody>
+      </p:sp>
+      <p:sp>
+        <p:nvSpPr>
+          <p:cNvPr id="24" name="TextBox 23">
+            <a:extLst>
+              <a:ext uri="{FF2B5EF4-FFF2-40B4-BE49-F238E27FC236}">
+                <a16:creationId xmlns:a16="http://schemas.microsoft.com/office/drawing/2014/main" id="{87B1EAA5-D349-F8CB-CA7C-59D5287116E3}"/>
+              </a:ext>
+            </a:extLst>
+          </p:cNvPr>
+          <p:cNvSpPr txBox="1"/>
+          <p:nvPr/>
+        </p:nvSpPr>
+        <p:spPr>
+          <a:xfrm>
+            <a:off x="5519246" y="6581001"/>
+            <a:ext cx="6633634" cy="276999"/>
+          </a:xfrm>
+          <a:prstGeom prst="rect">
+            <a:avLst/>
+          </a:prstGeom>
+          <a:noFill/>
+        </p:spPr>
+        <p:txBody>
+          <a:bodyPr wrap="square" rtlCol="0">
+            <a:spAutoFit/>
+          </a:bodyPr>
+          <a:lstStyle/>
+          <a:p>
+            <a:r>
+              <a:rPr lang="en-IN" sz="1200" b="1" dirty="0"/>
+              <a:t>Note: Based on sampling points, the trajectory is expected to vary from one simulation run to another</a:t>
+            </a:r>
+          </a:p>
+        </p:txBody>
+      </p:sp>
       <p:pic>
         <p:nvPicPr>
-          <p:cNvPr id="5" name="Content Placeholder 4">
-            <a:extLst>
-              <a:ext uri="{FF2B5EF4-FFF2-40B4-BE49-F238E27FC236}">
-                <a16:creationId xmlns:a16="http://schemas.microsoft.com/office/drawing/2014/main" id="{1573BAD3-33C1-3B11-F09E-55AEA65A680B}"/>
+          <p:cNvPr id="4" name="Picture 3">
+            <a:extLst>
+              <a:ext uri="{FF2B5EF4-FFF2-40B4-BE49-F238E27FC236}">
+                <a16:creationId xmlns:a16="http://schemas.microsoft.com/office/drawing/2014/main" id="{6B9AF1CB-5FDD-933B-2EE0-1AB3E22A983A}"/>
               </a:ext>
             </a:extLst>
           </p:cNvPr>
           <p:cNvPicPr>
-            <a:picLocks noGrp="1" noChangeAspect="1"/>
+            <a:picLocks noChangeAspect="1"/>
           </p:cNvPicPr>
-          <p:nvPr>
-            <p:ph idx="1"/>
-          </p:nvPr>
+          <p:nvPr/>
         </p:nvPicPr>
         <p:blipFill>
           <a:blip r:embed="rId2"/>
@@ -4444,9 +4327,12 @@
         </p:blipFill>
         <p:spPr>
           <a:xfrm>
-            <a:off x="600555" y="1742814"/>
-            <a:ext cx="3574090" cy="3589331"/>
-          </a:xfrm>
+            <a:off x="8705498" y="5860215"/>
+            <a:ext cx="1729890" cy="396274"/>
+          </a:xfrm>
+          <a:prstGeom prst="rect">
+            <a:avLst/>
+          </a:prstGeom>
         </p:spPr>
       </p:pic>
       <p:pic>
@@ -4454,7 +4340,7 @@
           <p:cNvPr id="7" name="Picture 6">
             <a:extLst>
               <a:ext uri="{FF2B5EF4-FFF2-40B4-BE49-F238E27FC236}">
-                <a16:creationId xmlns:a16="http://schemas.microsoft.com/office/drawing/2014/main" id="{97DBE13E-D204-AB19-6A0F-233FAE5444E4}"/>
+                <a16:creationId xmlns:a16="http://schemas.microsoft.com/office/drawing/2014/main" id="{82AE41FA-C422-D868-84A6-2063E06761A8}"/>
               </a:ext>
             </a:extLst>
           </p:cNvPr>
@@ -4471,55 +4357,20 @@
         </p:blipFill>
         <p:spPr>
           <a:xfrm>
-            <a:off x="1528151" y="5517904"/>
-            <a:ext cx="1905165" cy="388654"/>
+            <a:off x="1908731" y="5867835"/>
+            <a:ext cx="1821338" cy="388654"/>
           </a:xfrm>
           <a:prstGeom prst="rect">
             <a:avLst/>
           </a:prstGeom>
         </p:spPr>
       </p:pic>
-      <p:sp>
-        <p:nvSpPr>
-          <p:cNvPr id="8" name="TextBox 7">
-            <a:extLst>
-              <a:ext uri="{FF2B5EF4-FFF2-40B4-BE49-F238E27FC236}">
-                <a16:creationId xmlns:a16="http://schemas.microsoft.com/office/drawing/2014/main" id="{E4E5809E-5CF5-AD0F-B0BB-6FA7214B5218}"/>
-              </a:ext>
-            </a:extLst>
-          </p:cNvPr>
-          <p:cNvSpPr txBox="1"/>
-          <p:nvPr/>
-        </p:nvSpPr>
-        <p:spPr>
-          <a:xfrm>
-            <a:off x="1528151" y="1465269"/>
-            <a:ext cx="1716634" cy="369332"/>
-          </a:xfrm>
-          <a:prstGeom prst="rect">
-            <a:avLst/>
-          </a:prstGeom>
-          <a:noFill/>
-        </p:spPr>
-        <p:txBody>
-          <a:bodyPr wrap="square" rtlCol="0">
-            <a:spAutoFit/>
-          </a:bodyPr>
-          <a:lstStyle/>
-          <a:p>
-            <a:r>
-              <a:rPr lang="en-IN" b="1" dirty="0"/>
-              <a:t>RRT exploration</a:t>
-            </a:r>
-          </a:p>
-        </p:txBody>
-      </p:sp>
       <p:pic>
         <p:nvPicPr>
-          <p:cNvPr id="10" name="Picture 9">
-            <a:extLst>
-              <a:ext uri="{FF2B5EF4-FFF2-40B4-BE49-F238E27FC236}">
-                <a16:creationId xmlns:a16="http://schemas.microsoft.com/office/drawing/2014/main" id="{727B137B-679F-D552-334B-F84BC86A47A5}"/>
+          <p:cNvPr id="11" name="Picture 10">
+            <a:extLst>
+              <a:ext uri="{FF2B5EF4-FFF2-40B4-BE49-F238E27FC236}">
+                <a16:creationId xmlns:a16="http://schemas.microsoft.com/office/drawing/2014/main" id="{7DB7DF7D-29F4-4AEB-084D-21D32C5ED79E}"/>
               </a:ext>
             </a:extLst>
           </p:cNvPr>
@@ -4536,55 +4387,20 @@
         </p:blipFill>
         <p:spPr>
           <a:xfrm>
-            <a:off x="4360912" y="1742814"/>
-            <a:ext cx="3574090" cy="3592450"/>
+            <a:off x="7503030" y="1929601"/>
+            <a:ext cx="3910594" cy="3930614"/>
           </a:xfrm>
           <a:prstGeom prst="rect">
             <a:avLst/>
           </a:prstGeom>
         </p:spPr>
       </p:pic>
-      <p:sp>
-        <p:nvSpPr>
-          <p:cNvPr id="11" name="TextBox 10">
-            <a:extLst>
-              <a:ext uri="{FF2B5EF4-FFF2-40B4-BE49-F238E27FC236}">
-                <a16:creationId xmlns:a16="http://schemas.microsoft.com/office/drawing/2014/main" id="{DE57D531-1650-2254-A566-E5273DB05DE8}"/>
-              </a:ext>
-            </a:extLst>
-          </p:cNvPr>
-          <p:cNvSpPr txBox="1"/>
-          <p:nvPr/>
-        </p:nvSpPr>
-        <p:spPr>
-          <a:xfrm>
-            <a:off x="5904222" y="1465269"/>
-            <a:ext cx="622936" cy="376384"/>
-          </a:xfrm>
-          <a:prstGeom prst="rect">
-            <a:avLst/>
-          </a:prstGeom>
-          <a:noFill/>
-        </p:spPr>
-        <p:txBody>
-          <a:bodyPr wrap="square" rtlCol="0">
-            <a:spAutoFit/>
-          </a:bodyPr>
-          <a:lstStyle/>
-          <a:p>
-            <a:r>
-              <a:rPr lang="en-IN" b="1" dirty="0"/>
-              <a:t>RRT</a:t>
-            </a:r>
-          </a:p>
-        </p:txBody>
-      </p:sp>
       <p:pic>
         <p:nvPicPr>
-          <p:cNvPr id="13" name="Picture 12">
-            <a:extLst>
-              <a:ext uri="{FF2B5EF4-FFF2-40B4-BE49-F238E27FC236}">
-                <a16:creationId xmlns:a16="http://schemas.microsoft.com/office/drawing/2014/main" id="{6EB6BFD8-5675-8AA9-3B9D-2337D428F509}"/>
+          <p:cNvPr id="14" name="Picture 13">
+            <a:extLst>
+              <a:ext uri="{FF2B5EF4-FFF2-40B4-BE49-F238E27FC236}">
+                <a16:creationId xmlns:a16="http://schemas.microsoft.com/office/drawing/2014/main" id="{820D1E89-18A9-0ED4-EBBD-A59BCF1C6B54}"/>
               </a:ext>
             </a:extLst>
           </p:cNvPr>
@@ -4601,50 +4417,20 @@
         </p:blipFill>
         <p:spPr>
           <a:xfrm>
-            <a:off x="5335503" y="5517904"/>
-            <a:ext cx="1760373" cy="388654"/>
+            <a:off x="864102" y="1970472"/>
+            <a:ext cx="3910596" cy="3897363"/>
           </a:xfrm>
           <a:prstGeom prst="rect">
             <a:avLst/>
           </a:prstGeom>
         </p:spPr>
       </p:pic>
-      <p:pic>
-        <p:nvPicPr>
-          <p:cNvPr id="15" name="Picture 14">
-            <a:extLst>
-              <a:ext uri="{FF2B5EF4-FFF2-40B4-BE49-F238E27FC236}">
-                <a16:creationId xmlns:a16="http://schemas.microsoft.com/office/drawing/2014/main" id="{7A5063EB-4626-53D7-29CC-74A784CE97F7}"/>
-              </a:ext>
-            </a:extLst>
-          </p:cNvPr>
-          <p:cNvPicPr>
-            <a:picLocks noChangeAspect="1"/>
-          </p:cNvPicPr>
-          <p:nvPr/>
-        </p:nvPicPr>
-        <p:blipFill>
-          <a:blip r:embed="rId6"/>
-          <a:stretch>
-            <a:fillRect/>
-          </a:stretch>
-        </p:blipFill>
-        <p:spPr>
-          <a:xfrm>
-            <a:off x="8228160" y="1742814"/>
-            <a:ext cx="3574090" cy="3586247"/>
-          </a:xfrm>
-          <a:prstGeom prst="rect">
-            <a:avLst/>
-          </a:prstGeom>
-        </p:spPr>
-      </p:pic>
-      <p:sp>
-        <p:nvSpPr>
-          <p:cNvPr id="16" name="TextBox 15">
-            <a:extLst>
-              <a:ext uri="{FF2B5EF4-FFF2-40B4-BE49-F238E27FC236}">
-                <a16:creationId xmlns:a16="http://schemas.microsoft.com/office/drawing/2014/main" id="{21B08A93-28CC-88EF-E39D-4ABC2345C615}"/>
+      <p:sp>
+        <p:nvSpPr>
+          <p:cNvPr id="15" name="TextBox 14">
+            <a:extLst>
+              <a:ext uri="{FF2B5EF4-FFF2-40B4-BE49-F238E27FC236}">
+                <a16:creationId xmlns:a16="http://schemas.microsoft.com/office/drawing/2014/main" id="{CB09E4EE-E0FA-7A52-9039-AE43523B7FEE}"/>
               </a:ext>
             </a:extLst>
           </p:cNvPr>
@@ -4653,8 +4439,8 @@
         </p:nvSpPr>
         <p:spPr>
           <a:xfrm>
-            <a:off x="9840460" y="1465269"/>
-            <a:ext cx="1153506" cy="376384"/>
+            <a:off x="510618" y="1076370"/>
+            <a:ext cx="9090581" cy="369332"/>
           </a:xfrm>
           <a:prstGeom prst="rect">
             <a:avLst/>
@@ -4668,46 +4454,16 @@
           <a:lstStyle/>
           <a:p>
             <a:r>
-              <a:rPr lang="en-IN" b="1" dirty="0"/>
-              <a:t>RRT*</a:t>
-            </a:r>
-          </a:p>
-        </p:txBody>
-      </p:sp>
-      <p:pic>
-        <p:nvPicPr>
-          <p:cNvPr id="18" name="Picture 17">
-            <a:extLst>
-              <a:ext uri="{FF2B5EF4-FFF2-40B4-BE49-F238E27FC236}">
-                <a16:creationId xmlns:a16="http://schemas.microsoft.com/office/drawing/2014/main" id="{3F7D1A15-7B92-9462-6536-D5DE454516E0}"/>
-              </a:ext>
-            </a:extLst>
-          </p:cNvPr>
-          <p:cNvPicPr>
-            <a:picLocks noChangeAspect="1"/>
-          </p:cNvPicPr>
-          <p:nvPr/>
-        </p:nvPicPr>
-        <p:blipFill>
-          <a:blip r:embed="rId7"/>
-          <a:stretch>
-            <a:fillRect/>
-          </a:stretch>
-        </p:blipFill>
-        <p:spPr>
-          <a:xfrm>
-            <a:off x="8998063" y="5418835"/>
-            <a:ext cx="2301439" cy="586791"/>
-          </a:xfrm>
-          <a:prstGeom prst="rect">
-            <a:avLst/>
-          </a:prstGeom>
-        </p:spPr>
-      </p:pic>
+              <a:rPr lang="en-IN" dirty="0"/>
+              <a:t>Random Seeds are set to the same value for repeatability of results for comparison.</a:t>
+            </a:r>
+          </a:p>
+        </p:txBody>
+      </p:sp>
     </p:spTree>
     <p:extLst>
       <p:ext uri="{BB962C8B-B14F-4D97-AF65-F5344CB8AC3E}">
-        <p14:creationId xmlns:p14="http://schemas.microsoft.com/office/powerpoint/2010/main" val="1245269758"/>
+        <p14:creationId xmlns:p14="http://schemas.microsoft.com/office/powerpoint/2010/main" val="3999018129"/>
       </p:ext>
     </p:extLst>
   </p:cSld>
@@ -5122,117 +4878,12 @@
           </a:p>
         </p:txBody>
       </p:sp>
-      <p:sp>
-        <p:nvSpPr>
-          <p:cNvPr id="12" name="TextBox 11">
-            <a:extLst>
-              <a:ext uri="{FF2B5EF4-FFF2-40B4-BE49-F238E27FC236}">
-                <a16:creationId xmlns:a16="http://schemas.microsoft.com/office/drawing/2014/main" id="{FE68F358-959E-45E7-D433-852CE9D9C3A7}"/>
-              </a:ext>
-            </a:extLst>
-          </p:cNvPr>
-          <p:cNvSpPr txBox="1"/>
-          <p:nvPr/>
-        </p:nvSpPr>
-        <p:spPr>
-          <a:xfrm>
-            <a:off x="2507932" y="1621429"/>
-            <a:ext cx="622936" cy="376384"/>
-          </a:xfrm>
-          <a:prstGeom prst="rect">
-            <a:avLst/>
-          </a:prstGeom>
-          <a:noFill/>
-        </p:spPr>
-        <p:txBody>
-          <a:bodyPr wrap="square" rtlCol="0">
-            <a:spAutoFit/>
-          </a:bodyPr>
-          <a:lstStyle/>
-          <a:p>
-            <a:r>
-              <a:rPr lang="en-IN" b="1" dirty="0"/>
-              <a:t>RRT</a:t>
-            </a:r>
-          </a:p>
-        </p:txBody>
-      </p:sp>
-      <p:sp>
-        <p:nvSpPr>
-          <p:cNvPr id="17" name="TextBox 16">
-            <a:extLst>
-              <a:ext uri="{FF2B5EF4-FFF2-40B4-BE49-F238E27FC236}">
-                <a16:creationId xmlns:a16="http://schemas.microsoft.com/office/drawing/2014/main" id="{5476DF6A-6E2C-E0B4-CC51-D2CC2D5CA585}"/>
-              </a:ext>
-            </a:extLst>
-          </p:cNvPr>
-          <p:cNvSpPr txBox="1"/>
-          <p:nvPr/>
-        </p:nvSpPr>
-        <p:spPr>
-          <a:xfrm>
-            <a:off x="9156387" y="1619444"/>
-            <a:ext cx="1153506" cy="376384"/>
-          </a:xfrm>
-          <a:prstGeom prst="rect">
-            <a:avLst/>
-          </a:prstGeom>
-          <a:noFill/>
-        </p:spPr>
-        <p:txBody>
-          <a:bodyPr wrap="square" rtlCol="0">
-            <a:spAutoFit/>
-          </a:bodyPr>
-          <a:lstStyle/>
-          <a:p>
-            <a:r>
-              <a:rPr lang="en-IN" b="1" dirty="0"/>
-              <a:t>RRT*</a:t>
-            </a:r>
-          </a:p>
-        </p:txBody>
-      </p:sp>
-      <p:sp>
-        <p:nvSpPr>
-          <p:cNvPr id="24" name="TextBox 23">
-            <a:extLst>
-              <a:ext uri="{FF2B5EF4-FFF2-40B4-BE49-F238E27FC236}">
-                <a16:creationId xmlns:a16="http://schemas.microsoft.com/office/drawing/2014/main" id="{87B1EAA5-D349-F8CB-CA7C-59D5287116E3}"/>
-              </a:ext>
-            </a:extLst>
-          </p:cNvPr>
-          <p:cNvSpPr txBox="1"/>
-          <p:nvPr/>
-        </p:nvSpPr>
-        <p:spPr>
-          <a:xfrm>
-            <a:off x="5519246" y="6581001"/>
-            <a:ext cx="6633634" cy="276999"/>
-          </a:xfrm>
-          <a:prstGeom prst="rect">
-            <a:avLst/>
-          </a:prstGeom>
-          <a:noFill/>
-        </p:spPr>
-        <p:txBody>
-          <a:bodyPr wrap="square" rtlCol="0">
-            <a:spAutoFit/>
-          </a:bodyPr>
-          <a:lstStyle/>
-          <a:p>
-            <a:r>
-              <a:rPr lang="en-IN" sz="1200" b="1" dirty="0"/>
-              <a:t>Note: Based on sampling points, the trajectory is expected to vary from one simulation run to another</a:t>
-            </a:r>
-          </a:p>
-        </p:txBody>
-      </p:sp>
       <p:pic>
         <p:nvPicPr>
-          <p:cNvPr id="4" name="Picture 3">
-            <a:extLst>
-              <a:ext uri="{FF2B5EF4-FFF2-40B4-BE49-F238E27FC236}">
-                <a16:creationId xmlns:a16="http://schemas.microsoft.com/office/drawing/2014/main" id="{6B9AF1CB-5FDD-933B-2EE0-1AB3E22A983A}"/>
+          <p:cNvPr id="6" name="Picture 5">
+            <a:extLst>
+              <a:ext uri="{FF2B5EF4-FFF2-40B4-BE49-F238E27FC236}">
+                <a16:creationId xmlns:a16="http://schemas.microsoft.com/office/drawing/2014/main" id="{03BD947A-B0EC-6B92-0BB4-60C938BE1675}"/>
               </a:ext>
             </a:extLst>
           </p:cNvPr>
@@ -5249,8 +4900,8 @@
         </p:blipFill>
         <p:spPr>
           <a:xfrm>
-            <a:off x="8705498" y="5860215"/>
-            <a:ext cx="1729890" cy="396274"/>
+            <a:off x="4182533" y="1502451"/>
+            <a:ext cx="3603721" cy="3628362"/>
           </a:xfrm>
           <a:prstGeom prst="rect">
             <a:avLst/>
@@ -5259,10 +4910,10 @@
       </p:pic>
       <p:pic>
         <p:nvPicPr>
-          <p:cNvPr id="7" name="Picture 6">
-            <a:extLst>
-              <a:ext uri="{FF2B5EF4-FFF2-40B4-BE49-F238E27FC236}">
-                <a16:creationId xmlns:a16="http://schemas.microsoft.com/office/drawing/2014/main" id="{82AE41FA-C422-D868-84A6-2063E06761A8}"/>
+          <p:cNvPr id="8" name="Picture 7">
+            <a:extLst>
+              <a:ext uri="{FF2B5EF4-FFF2-40B4-BE49-F238E27FC236}">
+                <a16:creationId xmlns:a16="http://schemas.microsoft.com/office/drawing/2014/main" id="{2BF673AC-F459-B0D3-5137-ED1816A87D1B}"/>
               </a:ext>
             </a:extLst>
           </p:cNvPr>
@@ -5279,20 +4930,160 @@
         </p:blipFill>
         <p:spPr>
           <a:xfrm>
-            <a:off x="1908731" y="5867835"/>
-            <a:ext cx="1821338" cy="388654"/>
+            <a:off x="5088965" y="5318006"/>
+            <a:ext cx="1790855" cy="563929"/>
           </a:xfrm>
           <a:prstGeom prst="rect">
             <a:avLst/>
           </a:prstGeom>
         </p:spPr>
       </p:pic>
+      <p:sp>
+        <p:nvSpPr>
+          <p:cNvPr id="9" name="TextBox 8">
+            <a:extLst>
+              <a:ext uri="{FF2B5EF4-FFF2-40B4-BE49-F238E27FC236}">
+                <a16:creationId xmlns:a16="http://schemas.microsoft.com/office/drawing/2014/main" id="{459C2176-5F6A-0C96-34A9-4B2A70547910}"/>
+              </a:ext>
+            </a:extLst>
+          </p:cNvPr>
+          <p:cNvSpPr txBox="1"/>
+          <p:nvPr/>
+        </p:nvSpPr>
+        <p:spPr>
+          <a:xfrm>
+            <a:off x="5519246" y="1198477"/>
+            <a:ext cx="1153506" cy="376384"/>
+          </a:xfrm>
+          <a:prstGeom prst="rect">
+            <a:avLst/>
+          </a:prstGeom>
+          <a:noFill/>
+        </p:spPr>
+        <p:txBody>
+          <a:bodyPr wrap="square" rtlCol="0">
+            <a:spAutoFit/>
+          </a:bodyPr>
+          <a:lstStyle/>
+          <a:p>
+            <a:r>
+              <a:rPr lang="en-IN" b="1" dirty="0"/>
+              <a:t>Hybrid A*</a:t>
+            </a:r>
+          </a:p>
+        </p:txBody>
+      </p:sp>
+      <p:sp>
+        <p:nvSpPr>
+          <p:cNvPr id="12" name="TextBox 11">
+            <a:extLst>
+              <a:ext uri="{FF2B5EF4-FFF2-40B4-BE49-F238E27FC236}">
+                <a16:creationId xmlns:a16="http://schemas.microsoft.com/office/drawing/2014/main" id="{FE68F358-959E-45E7-D433-852CE9D9C3A7}"/>
+              </a:ext>
+            </a:extLst>
+          </p:cNvPr>
+          <p:cNvSpPr txBox="1"/>
+          <p:nvPr/>
+        </p:nvSpPr>
+        <p:spPr>
+          <a:xfrm>
+            <a:off x="1716682" y="1198477"/>
+            <a:ext cx="622936" cy="376384"/>
+          </a:xfrm>
+          <a:prstGeom prst="rect">
+            <a:avLst/>
+          </a:prstGeom>
+          <a:noFill/>
+        </p:spPr>
+        <p:txBody>
+          <a:bodyPr wrap="square" rtlCol="0">
+            <a:spAutoFit/>
+          </a:bodyPr>
+          <a:lstStyle/>
+          <a:p>
+            <a:r>
+              <a:rPr lang="en-IN" b="1" dirty="0"/>
+              <a:t>RRT</a:t>
+            </a:r>
+          </a:p>
+        </p:txBody>
+      </p:sp>
+      <p:sp>
+        <p:nvSpPr>
+          <p:cNvPr id="17" name="TextBox 16">
+            <a:extLst>
+              <a:ext uri="{FF2B5EF4-FFF2-40B4-BE49-F238E27FC236}">
+                <a16:creationId xmlns:a16="http://schemas.microsoft.com/office/drawing/2014/main" id="{5476DF6A-6E2C-E0B4-CC51-D2CC2D5CA585}"/>
+              </a:ext>
+            </a:extLst>
+          </p:cNvPr>
+          <p:cNvSpPr txBox="1"/>
+          <p:nvPr/>
+        </p:nvSpPr>
+        <p:spPr>
+          <a:xfrm>
+            <a:off x="9713460" y="1203154"/>
+            <a:ext cx="1153506" cy="376384"/>
+          </a:xfrm>
+          <a:prstGeom prst="rect">
+            <a:avLst/>
+          </a:prstGeom>
+          <a:noFill/>
+        </p:spPr>
+        <p:txBody>
+          <a:bodyPr wrap="square" rtlCol="0">
+            <a:spAutoFit/>
+          </a:bodyPr>
+          <a:lstStyle/>
+          <a:p>
+            <a:r>
+              <a:rPr lang="en-IN" b="1" dirty="0"/>
+              <a:t>RRT*</a:t>
+            </a:r>
+          </a:p>
+        </p:txBody>
+      </p:sp>
+      <p:sp>
+        <p:nvSpPr>
+          <p:cNvPr id="24" name="TextBox 23">
+            <a:extLst>
+              <a:ext uri="{FF2B5EF4-FFF2-40B4-BE49-F238E27FC236}">
+                <a16:creationId xmlns:a16="http://schemas.microsoft.com/office/drawing/2014/main" id="{87B1EAA5-D349-F8CB-CA7C-59D5287116E3}"/>
+              </a:ext>
+            </a:extLst>
+          </p:cNvPr>
+          <p:cNvSpPr txBox="1"/>
+          <p:nvPr/>
+        </p:nvSpPr>
+        <p:spPr>
+          <a:xfrm>
+            <a:off x="5519246" y="6581001"/>
+            <a:ext cx="6633634" cy="276999"/>
+          </a:xfrm>
+          <a:prstGeom prst="rect">
+            <a:avLst/>
+          </a:prstGeom>
+          <a:noFill/>
+        </p:spPr>
+        <p:txBody>
+          <a:bodyPr wrap="square" rtlCol="0">
+            <a:spAutoFit/>
+          </a:bodyPr>
+          <a:lstStyle/>
+          <a:p>
+            <a:r>
+              <a:rPr lang="en-IN" sz="1200" b="1" dirty="0"/>
+              <a:t>Note: Based on sampling points, the trajectory is expected to vary from one simulation run to another</a:t>
+            </a:r>
+          </a:p>
+        </p:txBody>
+      </p:sp>
       <p:pic>
         <p:nvPicPr>
-          <p:cNvPr id="11" name="Picture 10">
-            <a:extLst>
-              <a:ext uri="{FF2B5EF4-FFF2-40B4-BE49-F238E27FC236}">
-                <a16:creationId xmlns:a16="http://schemas.microsoft.com/office/drawing/2014/main" id="{7DB7DF7D-29F4-4AEB-084D-21D32C5ED79E}"/>
+          <p:cNvPr id="26" name="Picture 25">
+            <a:extLst>
+              <a:ext uri="{FF2B5EF4-FFF2-40B4-BE49-F238E27FC236}">
+                <a16:creationId xmlns:a16="http://schemas.microsoft.com/office/drawing/2014/main" id="{22ACDA58-EB72-AE95-5E82-3132B80D9EF0}"/>
               </a:ext>
             </a:extLst>
           </p:cNvPr>
@@ -5309,8 +5100,8 @@
         </p:blipFill>
         <p:spPr>
           <a:xfrm>
-            <a:off x="7503030" y="1929601"/>
-            <a:ext cx="3910594" cy="3930614"/>
+            <a:off x="8204217" y="1485004"/>
+            <a:ext cx="3603721" cy="3615917"/>
           </a:xfrm>
           <a:prstGeom prst="rect">
             <a:avLst/>
@@ -5319,10 +5110,10 @@
       </p:pic>
       <p:pic>
         <p:nvPicPr>
-          <p:cNvPr id="14" name="Picture 13">
-            <a:extLst>
-              <a:ext uri="{FF2B5EF4-FFF2-40B4-BE49-F238E27FC236}">
-                <a16:creationId xmlns:a16="http://schemas.microsoft.com/office/drawing/2014/main" id="{820D1E89-18A9-0ED4-EBBD-A59BCF1C6B54}"/>
+          <p:cNvPr id="28" name="Picture 27">
+            <a:extLst>
+              <a:ext uri="{FF2B5EF4-FFF2-40B4-BE49-F238E27FC236}">
+                <a16:creationId xmlns:a16="http://schemas.microsoft.com/office/drawing/2014/main" id="{B96B876A-63B3-3C84-C4DF-E952F9DAAC6A}"/>
               </a:ext>
             </a:extLst>
           </p:cNvPr>
@@ -5339,53 +5130,78 @@
         </p:blipFill>
         <p:spPr>
           <a:xfrm>
-            <a:off x="864102" y="1970472"/>
-            <a:ext cx="3910596" cy="3897363"/>
+            <a:off x="9091598" y="5279176"/>
+            <a:ext cx="1828958" cy="388654"/>
           </a:xfrm>
           <a:prstGeom prst="rect">
             <a:avLst/>
           </a:prstGeom>
         </p:spPr>
       </p:pic>
-      <p:sp>
-        <p:nvSpPr>
-          <p:cNvPr id="15" name="TextBox 14">
-            <a:extLst>
-              <a:ext uri="{FF2B5EF4-FFF2-40B4-BE49-F238E27FC236}">
-                <a16:creationId xmlns:a16="http://schemas.microsoft.com/office/drawing/2014/main" id="{CB09E4EE-E0FA-7A52-9039-AE43523B7FEE}"/>
-              </a:ext>
-            </a:extLst>
-          </p:cNvPr>
-          <p:cNvSpPr txBox="1"/>
+      <p:pic>
+        <p:nvPicPr>
+          <p:cNvPr id="30" name="Picture 29">
+            <a:extLst>
+              <a:ext uri="{FF2B5EF4-FFF2-40B4-BE49-F238E27FC236}">
+                <a16:creationId xmlns:a16="http://schemas.microsoft.com/office/drawing/2014/main" id="{8EF1A38E-D171-B957-9BB3-CA7209DA98B5}"/>
+              </a:ext>
+            </a:extLst>
+          </p:cNvPr>
+          <p:cNvPicPr>
+            <a:picLocks noChangeAspect="1"/>
+          </p:cNvPicPr>
           <p:nvPr/>
-        </p:nvSpPr>
-        <p:spPr>
-          <a:xfrm>
-            <a:off x="510619" y="1076370"/>
-            <a:ext cx="7899956" cy="369332"/>
+        </p:nvPicPr>
+        <p:blipFill>
+          <a:blip r:embed="rId6"/>
+          <a:stretch>
+            <a:fillRect/>
+          </a:stretch>
+        </p:blipFill>
+        <p:spPr>
+          <a:xfrm>
+            <a:off x="1071757" y="5409453"/>
+            <a:ext cx="1912786" cy="381033"/>
           </a:xfrm>
           <a:prstGeom prst="rect">
             <a:avLst/>
           </a:prstGeom>
-          <a:noFill/>
-        </p:spPr>
-        <p:txBody>
-          <a:bodyPr wrap="square" rtlCol="0">
-            <a:spAutoFit/>
-          </a:bodyPr>
-          <a:lstStyle/>
-          <a:p>
-            <a:r>
-              <a:rPr lang="en-IN" dirty="0"/>
-              <a:t>Random Seeds are set to the same value for better results for comparison.</a:t>
-            </a:r>
-          </a:p>
-        </p:txBody>
-      </p:sp>
+        </p:spPr>
+      </p:pic>
+      <p:pic>
+        <p:nvPicPr>
+          <p:cNvPr id="32" name="Picture 31">
+            <a:extLst>
+              <a:ext uri="{FF2B5EF4-FFF2-40B4-BE49-F238E27FC236}">
+                <a16:creationId xmlns:a16="http://schemas.microsoft.com/office/drawing/2014/main" id="{9170AD8D-603A-3AA8-2954-BE7BFF3E3E40}"/>
+              </a:ext>
+            </a:extLst>
+          </p:cNvPr>
+          <p:cNvPicPr>
+            <a:picLocks noChangeAspect="1"/>
+          </p:cNvPicPr>
+          <p:nvPr/>
+        </p:nvPicPr>
+        <p:blipFill>
+          <a:blip r:embed="rId7"/>
+          <a:stretch>
+            <a:fillRect/>
+          </a:stretch>
+        </p:blipFill>
+        <p:spPr>
+          <a:xfrm>
+            <a:off x="286206" y="1502451"/>
+            <a:ext cx="3665456" cy="3670457"/>
+          </a:xfrm>
+          <a:prstGeom prst="rect">
+            <a:avLst/>
+          </a:prstGeom>
+        </p:spPr>
+      </p:pic>
     </p:spTree>
     <p:extLst>
       <p:ext uri="{BB962C8B-B14F-4D97-AF65-F5344CB8AC3E}">
-        <p14:creationId xmlns:p14="http://schemas.microsoft.com/office/powerpoint/2010/main" val="1809958434"/>
+        <p14:creationId xmlns:p14="http://schemas.microsoft.com/office/powerpoint/2010/main" val="1600263148"/>
       </p:ext>
     </p:extLst>
   </p:cSld>
@@ -5417,7 +5233,7 @@
           <p:cNvPr id="2" name="Title 1">
             <a:extLst>
               <a:ext uri="{FF2B5EF4-FFF2-40B4-BE49-F238E27FC236}">
-                <a16:creationId xmlns:a16="http://schemas.microsoft.com/office/drawing/2014/main" id="{A664A7C9-46B7-A164-90DC-81A930F11387}"/>
+                <a16:creationId xmlns:a16="http://schemas.microsoft.com/office/drawing/2014/main" id="{B485CD4E-6307-0825-9300-F9773296D3DC}"/>
               </a:ext>
             </a:extLst>
           </p:cNvPr>
@@ -5428,349 +5244,69 @@
             <p:ph type="title"/>
           </p:nvPr>
         </p:nvSpPr>
-        <p:spPr>
-          <a:xfrm>
-            <a:off x="351366" y="382059"/>
-            <a:ext cx="10515600" cy="557741"/>
+        <p:spPr/>
+        <p:txBody>
+          <a:bodyPr/>
+          <a:lstStyle/>
+          <a:p>
+            <a:r>
+              <a:rPr lang="en-IN" dirty="0"/>
+              <a:t>Benefits -</a:t>
+            </a:r>
+          </a:p>
+        </p:txBody>
+      </p:sp>
+      <p:sp>
+        <p:nvSpPr>
+          <p:cNvPr id="3" name="Content Placeholder 2">
+            <a:extLst>
+              <a:ext uri="{FF2B5EF4-FFF2-40B4-BE49-F238E27FC236}">
+                <a16:creationId xmlns:a16="http://schemas.microsoft.com/office/drawing/2014/main" id="{ACFE8E30-5F95-5B69-2ED6-91282E484EB7}"/>
+              </a:ext>
+            </a:extLst>
+          </p:cNvPr>
+          <p:cNvSpPr>
+            <a:spLocks noGrp="1"/>
+          </p:cNvSpPr>
+          <p:nvPr>
+            <p:ph idx="1"/>
+          </p:nvPr>
+        </p:nvSpPr>
+        <p:spPr>
+          <a:xfrm>
+            <a:off x="731520" y="1547707"/>
+            <a:ext cx="10515600" cy="4720696"/>
           </a:xfrm>
         </p:spPr>
         <p:txBody>
           <a:bodyPr>
-            <a:normAutofit fontScale="90000"/>
+            <a:normAutofit/>
           </a:bodyPr>
           <a:lstStyle/>
           <a:p>
             <a:r>
-              <a:rPr lang="en-IN" dirty="0"/>
-              <a:t>Algorithm Comparison -</a:t>
-            </a:r>
-          </a:p>
-        </p:txBody>
-      </p:sp>
-      <p:pic>
-        <p:nvPicPr>
-          <p:cNvPr id="6" name="Picture 5">
-            <a:extLst>
-              <a:ext uri="{FF2B5EF4-FFF2-40B4-BE49-F238E27FC236}">
-                <a16:creationId xmlns:a16="http://schemas.microsoft.com/office/drawing/2014/main" id="{03BD947A-B0EC-6B92-0BB4-60C938BE1675}"/>
-              </a:ext>
-            </a:extLst>
-          </p:cNvPr>
-          <p:cNvPicPr>
-            <a:picLocks noChangeAspect="1"/>
-          </p:cNvPicPr>
-          <p:nvPr/>
-        </p:nvPicPr>
-        <p:blipFill>
-          <a:blip r:embed="rId2"/>
-          <a:stretch>
-            <a:fillRect/>
-          </a:stretch>
-        </p:blipFill>
-        <p:spPr>
-          <a:xfrm>
-            <a:off x="4182533" y="1502451"/>
-            <a:ext cx="3603721" cy="3628362"/>
-          </a:xfrm>
-          <a:prstGeom prst="rect">
-            <a:avLst/>
-          </a:prstGeom>
-        </p:spPr>
-      </p:pic>
-      <p:pic>
-        <p:nvPicPr>
-          <p:cNvPr id="8" name="Picture 7">
-            <a:extLst>
-              <a:ext uri="{FF2B5EF4-FFF2-40B4-BE49-F238E27FC236}">
-                <a16:creationId xmlns:a16="http://schemas.microsoft.com/office/drawing/2014/main" id="{2BF673AC-F459-B0D3-5137-ED1816A87D1B}"/>
-              </a:ext>
-            </a:extLst>
-          </p:cNvPr>
-          <p:cNvPicPr>
-            <a:picLocks noChangeAspect="1"/>
-          </p:cNvPicPr>
-          <p:nvPr/>
-        </p:nvPicPr>
-        <p:blipFill>
-          <a:blip r:embed="rId3"/>
-          <a:stretch>
-            <a:fillRect/>
-          </a:stretch>
-        </p:blipFill>
-        <p:spPr>
-          <a:xfrm>
-            <a:off x="5088965" y="5318006"/>
-            <a:ext cx="1790855" cy="563929"/>
-          </a:xfrm>
-          <a:prstGeom prst="rect">
-            <a:avLst/>
-          </a:prstGeom>
-        </p:spPr>
-      </p:pic>
-      <p:sp>
-        <p:nvSpPr>
-          <p:cNvPr id="9" name="TextBox 8">
-            <a:extLst>
-              <a:ext uri="{FF2B5EF4-FFF2-40B4-BE49-F238E27FC236}">
-                <a16:creationId xmlns:a16="http://schemas.microsoft.com/office/drawing/2014/main" id="{459C2176-5F6A-0C96-34A9-4B2A70547910}"/>
-              </a:ext>
-            </a:extLst>
-          </p:cNvPr>
-          <p:cNvSpPr txBox="1"/>
-          <p:nvPr/>
-        </p:nvSpPr>
-        <p:spPr>
-          <a:xfrm>
-            <a:off x="5519246" y="1198477"/>
-            <a:ext cx="1153506" cy="376384"/>
-          </a:xfrm>
-          <a:prstGeom prst="rect">
-            <a:avLst/>
-          </a:prstGeom>
-          <a:noFill/>
-        </p:spPr>
-        <p:txBody>
-          <a:bodyPr wrap="square" rtlCol="0">
-            <a:spAutoFit/>
-          </a:bodyPr>
-          <a:lstStyle/>
-          <a:p>
-            <a:r>
-              <a:rPr lang="en-IN" b="1" dirty="0"/>
-              <a:t>Hybrid A*</a:t>
-            </a:r>
-          </a:p>
-        </p:txBody>
-      </p:sp>
-      <p:sp>
-        <p:nvSpPr>
-          <p:cNvPr id="12" name="TextBox 11">
-            <a:extLst>
-              <a:ext uri="{FF2B5EF4-FFF2-40B4-BE49-F238E27FC236}">
-                <a16:creationId xmlns:a16="http://schemas.microsoft.com/office/drawing/2014/main" id="{FE68F358-959E-45E7-D433-852CE9D9C3A7}"/>
-              </a:ext>
-            </a:extLst>
-          </p:cNvPr>
-          <p:cNvSpPr txBox="1"/>
-          <p:nvPr/>
-        </p:nvSpPr>
-        <p:spPr>
-          <a:xfrm>
-            <a:off x="1716682" y="1198477"/>
-            <a:ext cx="622936" cy="376384"/>
-          </a:xfrm>
-          <a:prstGeom prst="rect">
-            <a:avLst/>
-          </a:prstGeom>
-          <a:noFill/>
-        </p:spPr>
-        <p:txBody>
-          <a:bodyPr wrap="square" rtlCol="0">
-            <a:spAutoFit/>
-          </a:bodyPr>
-          <a:lstStyle/>
-          <a:p>
-            <a:r>
-              <a:rPr lang="en-IN" b="1" dirty="0"/>
-              <a:t>RRT</a:t>
-            </a:r>
-          </a:p>
-        </p:txBody>
-      </p:sp>
-      <p:sp>
-        <p:nvSpPr>
-          <p:cNvPr id="17" name="TextBox 16">
-            <a:extLst>
-              <a:ext uri="{FF2B5EF4-FFF2-40B4-BE49-F238E27FC236}">
-                <a16:creationId xmlns:a16="http://schemas.microsoft.com/office/drawing/2014/main" id="{5476DF6A-6E2C-E0B4-CC51-D2CC2D5CA585}"/>
-              </a:ext>
-            </a:extLst>
-          </p:cNvPr>
-          <p:cNvSpPr txBox="1"/>
-          <p:nvPr/>
-        </p:nvSpPr>
-        <p:spPr>
-          <a:xfrm>
-            <a:off x="9713460" y="1203154"/>
-            <a:ext cx="1153506" cy="376384"/>
-          </a:xfrm>
-          <a:prstGeom prst="rect">
-            <a:avLst/>
-          </a:prstGeom>
-          <a:noFill/>
-        </p:spPr>
-        <p:txBody>
-          <a:bodyPr wrap="square" rtlCol="0">
-            <a:spAutoFit/>
-          </a:bodyPr>
-          <a:lstStyle/>
-          <a:p>
-            <a:r>
-              <a:rPr lang="en-IN" b="1" dirty="0"/>
-              <a:t>RRT*</a:t>
-            </a:r>
-          </a:p>
-        </p:txBody>
-      </p:sp>
-      <p:sp>
-        <p:nvSpPr>
-          <p:cNvPr id="24" name="TextBox 23">
-            <a:extLst>
-              <a:ext uri="{FF2B5EF4-FFF2-40B4-BE49-F238E27FC236}">
-                <a16:creationId xmlns:a16="http://schemas.microsoft.com/office/drawing/2014/main" id="{87B1EAA5-D349-F8CB-CA7C-59D5287116E3}"/>
-              </a:ext>
-            </a:extLst>
-          </p:cNvPr>
-          <p:cNvSpPr txBox="1"/>
-          <p:nvPr/>
-        </p:nvSpPr>
-        <p:spPr>
-          <a:xfrm>
-            <a:off x="5519246" y="6581001"/>
-            <a:ext cx="6633634" cy="276999"/>
-          </a:xfrm>
-          <a:prstGeom prst="rect">
-            <a:avLst/>
-          </a:prstGeom>
-          <a:noFill/>
-        </p:spPr>
-        <p:txBody>
-          <a:bodyPr wrap="square" rtlCol="0">
-            <a:spAutoFit/>
-          </a:bodyPr>
-          <a:lstStyle/>
-          <a:p>
-            <a:r>
-              <a:rPr lang="en-IN" sz="1200" b="1" dirty="0"/>
-              <a:t>Note: Based on sampling points, the trajectory is expected to vary from one simulation run to another</a:t>
-            </a:r>
-          </a:p>
-        </p:txBody>
-      </p:sp>
-      <p:pic>
-        <p:nvPicPr>
-          <p:cNvPr id="26" name="Picture 25">
-            <a:extLst>
-              <a:ext uri="{FF2B5EF4-FFF2-40B4-BE49-F238E27FC236}">
-                <a16:creationId xmlns:a16="http://schemas.microsoft.com/office/drawing/2014/main" id="{22ACDA58-EB72-AE95-5E82-3132B80D9EF0}"/>
-              </a:ext>
-            </a:extLst>
-          </p:cNvPr>
-          <p:cNvPicPr>
-            <a:picLocks noChangeAspect="1"/>
-          </p:cNvPicPr>
-          <p:nvPr/>
-        </p:nvPicPr>
-        <p:blipFill>
-          <a:blip r:embed="rId4"/>
-          <a:stretch>
-            <a:fillRect/>
-          </a:stretch>
-        </p:blipFill>
-        <p:spPr>
-          <a:xfrm>
-            <a:off x="8204217" y="1485004"/>
-            <a:ext cx="3603721" cy="3615917"/>
-          </a:xfrm>
-          <a:prstGeom prst="rect">
-            <a:avLst/>
-          </a:prstGeom>
-        </p:spPr>
-      </p:pic>
-      <p:pic>
-        <p:nvPicPr>
-          <p:cNvPr id="28" name="Picture 27">
-            <a:extLst>
-              <a:ext uri="{FF2B5EF4-FFF2-40B4-BE49-F238E27FC236}">
-                <a16:creationId xmlns:a16="http://schemas.microsoft.com/office/drawing/2014/main" id="{B96B876A-63B3-3C84-C4DF-E952F9DAAC6A}"/>
-              </a:ext>
-            </a:extLst>
-          </p:cNvPr>
-          <p:cNvPicPr>
-            <a:picLocks noChangeAspect="1"/>
-          </p:cNvPicPr>
-          <p:nvPr/>
-        </p:nvPicPr>
-        <p:blipFill>
-          <a:blip r:embed="rId5"/>
-          <a:stretch>
-            <a:fillRect/>
-          </a:stretch>
-        </p:blipFill>
-        <p:spPr>
-          <a:xfrm>
-            <a:off x="9091598" y="5279176"/>
-            <a:ext cx="1828958" cy="388654"/>
-          </a:xfrm>
-          <a:prstGeom prst="rect">
-            <a:avLst/>
-          </a:prstGeom>
-        </p:spPr>
-      </p:pic>
-      <p:pic>
-        <p:nvPicPr>
-          <p:cNvPr id="30" name="Picture 29">
-            <a:extLst>
-              <a:ext uri="{FF2B5EF4-FFF2-40B4-BE49-F238E27FC236}">
-                <a16:creationId xmlns:a16="http://schemas.microsoft.com/office/drawing/2014/main" id="{8EF1A38E-D171-B957-9BB3-CA7209DA98B5}"/>
-              </a:ext>
-            </a:extLst>
-          </p:cNvPr>
-          <p:cNvPicPr>
-            <a:picLocks noChangeAspect="1"/>
-          </p:cNvPicPr>
-          <p:nvPr/>
-        </p:nvPicPr>
-        <p:blipFill>
-          <a:blip r:embed="rId6"/>
-          <a:stretch>
-            <a:fillRect/>
-          </a:stretch>
-        </p:blipFill>
-        <p:spPr>
-          <a:xfrm>
-            <a:off x="1071757" y="5409453"/>
-            <a:ext cx="1912786" cy="381033"/>
-          </a:xfrm>
-          <a:prstGeom prst="rect">
-            <a:avLst/>
-          </a:prstGeom>
-        </p:spPr>
-      </p:pic>
-      <p:pic>
-        <p:nvPicPr>
-          <p:cNvPr id="32" name="Picture 31">
-            <a:extLst>
-              <a:ext uri="{FF2B5EF4-FFF2-40B4-BE49-F238E27FC236}">
-                <a16:creationId xmlns:a16="http://schemas.microsoft.com/office/drawing/2014/main" id="{9170AD8D-603A-3AA8-2954-BE7BFF3E3E40}"/>
-              </a:ext>
-            </a:extLst>
-          </p:cNvPr>
-          <p:cNvPicPr>
-            <a:picLocks noChangeAspect="1"/>
-          </p:cNvPicPr>
-          <p:nvPr/>
-        </p:nvPicPr>
-        <p:blipFill>
-          <a:blip r:embed="rId7"/>
-          <a:stretch>
-            <a:fillRect/>
-          </a:stretch>
-        </p:blipFill>
-        <p:spPr>
-          <a:xfrm>
-            <a:off x="286206" y="1502451"/>
-            <a:ext cx="3665456" cy="3670457"/>
-          </a:xfrm>
-          <a:prstGeom prst="rect">
-            <a:avLst/>
-          </a:prstGeom>
-        </p:spPr>
-      </p:pic>
+              <a:rPr lang="en-IN" sz="2000" dirty="0"/>
+              <a:t>RRT* handles the complex environment that has multiple obstacles, narrow passages, or multiple paths to a goal. And, also RRT* can handle dynamic environment but A* assumes a static environment and can be inefficient when there are frequent changes.</a:t>
+            </a:r>
+          </a:p>
+          <a:p>
+            <a:r>
+              <a:rPr lang="en-IN" sz="2000" dirty="0"/>
+              <a:t>RRT* can optimize the path cost by iteratively improving the solution until it reaches the optimal path. A* provides a solution that is optimal but need not be the shortest path. </a:t>
+            </a:r>
+          </a:p>
+          <a:p>
+            <a:r>
+              <a:rPr lang="en-IN" sz="2000" dirty="0"/>
+              <a:t>Both RRT* and RRT are probabilistically complete algorithms – they guarantee a solution if one exists, with high probability. However, RRT* has a stronger completeness guarantee. Also it can achieve higher convergence as the tree expansion is guided towards goal region using a heuristic estimate.</a:t>
+            </a:r>
+          </a:p>
+        </p:txBody>
+      </p:sp>
     </p:spTree>
     <p:extLst>
       <p:ext uri="{BB962C8B-B14F-4D97-AF65-F5344CB8AC3E}">
-        <p14:creationId xmlns:p14="http://schemas.microsoft.com/office/powerpoint/2010/main" val="1600263148"/>
+        <p14:creationId xmlns:p14="http://schemas.microsoft.com/office/powerpoint/2010/main" val="2832758677"/>
       </p:ext>
     </p:extLst>
   </p:cSld>
@@ -5802,7 +5338,7 @@
           <p:cNvPr id="2" name="Title 1">
             <a:extLst>
               <a:ext uri="{FF2B5EF4-FFF2-40B4-BE49-F238E27FC236}">
-                <a16:creationId xmlns:a16="http://schemas.microsoft.com/office/drawing/2014/main" id="{A664A7C9-46B7-A164-90DC-81A930F11387}"/>
+                <a16:creationId xmlns:a16="http://schemas.microsoft.com/office/drawing/2014/main" id="{B485CD4E-6307-0825-9300-F9773296D3DC}"/>
               </a:ext>
             </a:extLst>
           </p:cNvPr>
@@ -5813,169 +5349,87 @@
             <p:ph type="title"/>
           </p:nvPr>
         </p:nvSpPr>
-        <p:spPr>
-          <a:xfrm>
-            <a:off x="351366" y="382059"/>
-            <a:ext cx="10515600" cy="557741"/>
+        <p:spPr/>
+        <p:txBody>
+          <a:bodyPr/>
+          <a:lstStyle/>
+          <a:p>
+            <a:r>
+              <a:rPr lang="en-IN" dirty="0"/>
+              <a:t>Drawbacks -</a:t>
+            </a:r>
+          </a:p>
+        </p:txBody>
+      </p:sp>
+      <p:sp>
+        <p:nvSpPr>
+          <p:cNvPr id="3" name="Content Placeholder 2">
+            <a:extLst>
+              <a:ext uri="{FF2B5EF4-FFF2-40B4-BE49-F238E27FC236}">
+                <a16:creationId xmlns:a16="http://schemas.microsoft.com/office/drawing/2014/main" id="{ACFE8E30-5F95-5B69-2ED6-91282E484EB7}"/>
+              </a:ext>
+            </a:extLst>
+          </p:cNvPr>
+          <p:cNvSpPr>
+            <a:spLocks noGrp="1"/>
+          </p:cNvSpPr>
+          <p:nvPr>
+            <p:ph idx="1"/>
+          </p:nvPr>
+        </p:nvSpPr>
+        <p:spPr>
+          <a:xfrm>
+            <a:off x="838200" y="1690688"/>
+            <a:ext cx="10515600" cy="4314296"/>
           </a:xfrm>
         </p:spPr>
         <p:txBody>
           <a:bodyPr>
-            <a:normAutofit fontScale="90000"/>
+            <a:normAutofit/>
           </a:bodyPr>
           <a:lstStyle/>
           <a:p>
             <a:r>
-              <a:rPr lang="en-IN" dirty="0"/>
-              <a:t>Algorithm Comparison (higher iteration)-</a:t>
-            </a:r>
-          </a:p>
-        </p:txBody>
-      </p:sp>
-      <p:sp>
-        <p:nvSpPr>
-          <p:cNvPr id="9" name="TextBox 8">
-            <a:extLst>
-              <a:ext uri="{FF2B5EF4-FFF2-40B4-BE49-F238E27FC236}">
-                <a16:creationId xmlns:a16="http://schemas.microsoft.com/office/drawing/2014/main" id="{459C2176-5F6A-0C96-34A9-4B2A70547910}"/>
-              </a:ext>
-            </a:extLst>
-          </p:cNvPr>
-          <p:cNvSpPr txBox="1"/>
-          <p:nvPr/>
-        </p:nvSpPr>
-        <p:spPr>
-          <a:xfrm>
-            <a:off x="5519246" y="1198477"/>
-            <a:ext cx="1153506" cy="376384"/>
-          </a:xfrm>
-          <a:prstGeom prst="rect">
-            <a:avLst/>
-          </a:prstGeom>
-          <a:noFill/>
-        </p:spPr>
-        <p:txBody>
-          <a:bodyPr wrap="square" rtlCol="0">
-            <a:spAutoFit/>
-          </a:bodyPr>
-          <a:lstStyle/>
-          <a:p>
-            <a:r>
-              <a:rPr lang="en-IN" b="1" dirty="0"/>
-              <a:t>Hybrid A*</a:t>
-            </a:r>
-          </a:p>
-        </p:txBody>
-      </p:sp>
-      <p:sp>
-        <p:nvSpPr>
-          <p:cNvPr id="12" name="TextBox 11">
-            <a:extLst>
-              <a:ext uri="{FF2B5EF4-FFF2-40B4-BE49-F238E27FC236}">
-                <a16:creationId xmlns:a16="http://schemas.microsoft.com/office/drawing/2014/main" id="{FE68F358-959E-45E7-D433-852CE9D9C3A7}"/>
-              </a:ext>
-            </a:extLst>
-          </p:cNvPr>
-          <p:cNvSpPr txBox="1"/>
-          <p:nvPr/>
-        </p:nvSpPr>
-        <p:spPr>
-          <a:xfrm>
-            <a:off x="1716682" y="1198477"/>
-            <a:ext cx="622936" cy="376384"/>
-          </a:xfrm>
-          <a:prstGeom prst="rect">
-            <a:avLst/>
-          </a:prstGeom>
-          <a:noFill/>
-        </p:spPr>
-        <p:txBody>
-          <a:bodyPr wrap="square" rtlCol="0">
-            <a:spAutoFit/>
-          </a:bodyPr>
-          <a:lstStyle/>
-          <a:p>
-            <a:r>
-              <a:rPr lang="en-IN" b="1" dirty="0"/>
-              <a:t>RRT</a:t>
-            </a:r>
-          </a:p>
-        </p:txBody>
-      </p:sp>
-      <p:sp>
-        <p:nvSpPr>
-          <p:cNvPr id="17" name="TextBox 16">
-            <a:extLst>
-              <a:ext uri="{FF2B5EF4-FFF2-40B4-BE49-F238E27FC236}">
-                <a16:creationId xmlns:a16="http://schemas.microsoft.com/office/drawing/2014/main" id="{5476DF6A-6E2C-E0B4-CC51-D2CC2D5CA585}"/>
-              </a:ext>
-            </a:extLst>
-          </p:cNvPr>
-          <p:cNvSpPr txBox="1"/>
-          <p:nvPr/>
-        </p:nvSpPr>
-        <p:spPr>
-          <a:xfrm>
-            <a:off x="9713460" y="1198477"/>
-            <a:ext cx="1153506" cy="376384"/>
-          </a:xfrm>
-          <a:prstGeom prst="rect">
-            <a:avLst/>
-          </a:prstGeom>
-          <a:noFill/>
-        </p:spPr>
-        <p:txBody>
-          <a:bodyPr wrap="square" rtlCol="0">
-            <a:spAutoFit/>
-          </a:bodyPr>
-          <a:lstStyle/>
-          <a:p>
-            <a:r>
-              <a:rPr lang="en-IN" b="1" dirty="0"/>
-              <a:t>RRT*</a:t>
-            </a:r>
-          </a:p>
-        </p:txBody>
-      </p:sp>
-      <p:sp>
-        <p:nvSpPr>
-          <p:cNvPr id="24" name="TextBox 23">
-            <a:extLst>
-              <a:ext uri="{FF2B5EF4-FFF2-40B4-BE49-F238E27FC236}">
-                <a16:creationId xmlns:a16="http://schemas.microsoft.com/office/drawing/2014/main" id="{87B1EAA5-D349-F8CB-CA7C-59D5287116E3}"/>
-              </a:ext>
-            </a:extLst>
-          </p:cNvPr>
-          <p:cNvSpPr txBox="1"/>
-          <p:nvPr/>
-        </p:nvSpPr>
-        <p:spPr>
-          <a:xfrm>
-            <a:off x="5519246" y="6581001"/>
-            <a:ext cx="6633634" cy="276999"/>
-          </a:xfrm>
-          <a:prstGeom prst="rect">
-            <a:avLst/>
-          </a:prstGeom>
-          <a:noFill/>
-        </p:spPr>
-        <p:txBody>
-          <a:bodyPr wrap="square" rtlCol="0">
-            <a:spAutoFit/>
-          </a:bodyPr>
-          <a:lstStyle/>
-          <a:p>
-            <a:r>
-              <a:rPr lang="en-IN" sz="1200" b="1" dirty="0"/>
-              <a:t>Note: Based on sampling points, the trajectory is expected to vary from one simulation run to another</a:t>
-            </a:r>
+              <a:rPr lang="en-US" sz="2000" b="0" i="0" dirty="0">
+                <a:effectLst/>
+                <a:latin typeface="Söhne"/>
+              </a:rPr>
+              <a:t>Although RRT* can find a feasible solution with a certain probability, it may not always find the optimal solution and its quality may vary based on the problem and environment.</a:t>
+            </a:r>
+          </a:p>
+          <a:p>
+            <a:r>
+              <a:rPr lang="en-US" sz="2000" b="0" i="0" dirty="0">
+                <a:effectLst/>
+                <a:latin typeface="Söhne"/>
+              </a:rPr>
+              <a:t>RRT* may not be suitable for problems that involve multiple agents or goals that require coordination, as it is designed for motion planning problems with a single start and goal configuration.</a:t>
+            </a:r>
+          </a:p>
+          <a:p>
+            <a:r>
+              <a:rPr lang="en-US" sz="2000" b="0" i="0" dirty="0">
+                <a:effectLst/>
+                <a:latin typeface="Söhne"/>
+              </a:rPr>
+              <a:t>Choosing optimal values for parameters such as step size, sampling density, and exploration radius can be challenging and require significant experimentation due to RRT*'s sensitivity to parameter choices.</a:t>
+            </a:r>
+          </a:p>
+          <a:p>
+            <a:r>
+              <a:rPr lang="en-US" sz="2000" dirty="0"/>
+              <a:t>The drawback of using graph-search techniques for trajectory generation is the resolution lost due to discretization of state space and/or control space. The only boundary states that can be reached are those that already exist in the network.</a:t>
+            </a:r>
+          </a:p>
+          <a:p>
+            <a:endParaRPr lang="en-IN" sz="2000" dirty="0"/>
           </a:p>
         </p:txBody>
       </p:sp>
     </p:spTree>
     <p:extLst>
       <p:ext uri="{BB962C8B-B14F-4D97-AF65-F5344CB8AC3E}">
-        <p14:creationId xmlns:p14="http://schemas.microsoft.com/office/powerpoint/2010/main" val="1815582857"/>
+        <p14:creationId xmlns:p14="http://schemas.microsoft.com/office/powerpoint/2010/main" val="3079339494"/>
       </p:ext>
     </p:extLst>
   </p:cSld>
@@ -6007,7 +5461,7 @@
           <p:cNvPr id="2" name="Title 1">
             <a:extLst>
               <a:ext uri="{FF2B5EF4-FFF2-40B4-BE49-F238E27FC236}">
-                <a16:creationId xmlns:a16="http://schemas.microsoft.com/office/drawing/2014/main" id="{B485CD4E-6307-0825-9300-F9773296D3DC}"/>
+                <a16:creationId xmlns:a16="http://schemas.microsoft.com/office/drawing/2014/main" id="{B161F8FB-7275-797D-C4EF-AB862C5BEB2F}"/>
               </a:ext>
             </a:extLst>
           </p:cNvPr>
@@ -6025,7 +5479,7 @@
           <a:p>
             <a:r>
               <a:rPr lang="en-IN" dirty="0"/>
-              <a:t>Benefits -</a:t>
+              <a:t>Path Smoothing Methods -</a:t>
             </a:r>
           </a:p>
         </p:txBody>
@@ -6035,7 +5489,7 @@
           <p:cNvPr id="3" name="Content Placeholder 2">
             <a:extLst>
               <a:ext uri="{FF2B5EF4-FFF2-40B4-BE49-F238E27FC236}">
-                <a16:creationId xmlns:a16="http://schemas.microsoft.com/office/drawing/2014/main" id="{ACFE8E30-5F95-5B69-2ED6-91282E484EB7}"/>
+                <a16:creationId xmlns:a16="http://schemas.microsoft.com/office/drawing/2014/main" id="{28F3AE4B-2109-9342-5062-4B2A2A26F388}"/>
               </a:ext>
             </a:extLst>
           </p:cNvPr>
@@ -6048,29 +5502,29 @@
         </p:nvSpPr>
         <p:spPr>
           <a:xfrm>
-            <a:off x="838200" y="1456267"/>
-            <a:ext cx="10515600" cy="4720696"/>
-          </a:xfrm>
-        </p:spPr>
-        <p:txBody>
-          <a:bodyPr>
-            <a:normAutofit/>
-          </a:bodyPr>
-          <a:lstStyle/>
-          <a:p>
-            <a:r>
-              <a:rPr lang="en-IN" sz="2000" dirty="0"/>
-              <a:t>Related to A*</a:t>
-            </a:r>
-          </a:p>
-          <a:p>
-            <a:r>
-              <a:rPr lang="en-IN" sz="2000" dirty="0" err="1"/>
-              <a:t>Comapred</a:t>
-            </a:r>
-            <a:r>
-              <a:rPr lang="en-IN" sz="2000" dirty="0"/>
-              <a:t> to RRT</a:t>
+            <a:off x="838200" y="1514475"/>
+            <a:ext cx="10515600" cy="1714500"/>
+          </a:xfrm>
+        </p:spPr>
+        <p:txBody>
+          <a:bodyPr/>
+          <a:lstStyle/>
+          <a:p>
+            <a:r>
+              <a:rPr lang="en-IN" dirty="0"/>
+              <a:t>Kalman Filtering</a:t>
+            </a:r>
+          </a:p>
+          <a:p>
+            <a:r>
+              <a:rPr lang="en-IN" dirty="0"/>
+              <a:t>Polynomial Fitting</a:t>
+            </a:r>
+          </a:p>
+          <a:p>
+            <a:r>
+              <a:rPr lang="en-IN" dirty="0"/>
+              <a:t>Spline based Smoothing </a:t>
             </a:r>
           </a:p>
         </p:txBody>
@@ -6078,7 +5532,7 @@
     </p:spTree>
     <p:extLst>
       <p:ext uri="{BB962C8B-B14F-4D97-AF65-F5344CB8AC3E}">
-        <p14:creationId xmlns:p14="http://schemas.microsoft.com/office/powerpoint/2010/main" val="2832758677"/>
+        <p14:creationId xmlns:p14="http://schemas.microsoft.com/office/powerpoint/2010/main" val="1283607664"/>
       </p:ext>
     </p:extLst>
   </p:cSld>

</xml_diff>